<commit_message>
chg: Added ground lased graphics
</commit_message>
<xml_diff>
--- a/Surface Attack Tactics/SAT Graphics.pptx
+++ b/Surface Attack Tactics/SAT Graphics.pptx
@@ -37,6 +37,8 @@
     <p:sldId id="289" r:id="rId31"/>
     <p:sldId id="285" r:id="rId32"/>
     <p:sldId id="286" r:id="rId33"/>
+    <p:sldId id="291" r:id="rId34"/>
+    <p:sldId id="290" r:id="rId35"/>
   </p:sldIdLst>
   <p:sldSz cx="9144000" cy="6858000" type="screen4x3"/>
   <p:notesSz cx="6858000" cy="9144000"/>
@@ -334,7 +336,7 @@
             <a:fld id="{C2CE8716-5A65-419C-B362-21FC49941D8F}" type="datetimeFigureOut">
               <a:rPr lang="nb-NO" smtClean="0"/>
               <a:pPr/>
-              <a:t>24.11.2019</a:t>
+              <a:t>25.11.2019</a:t>
             </a:fld>
             <a:endParaRPr lang="nb-NO"/>
           </a:p>
@@ -499,7 +501,7 @@
             <a:fld id="{C2CE8716-5A65-419C-B362-21FC49941D8F}" type="datetimeFigureOut">
               <a:rPr lang="nb-NO" smtClean="0"/>
               <a:pPr/>
-              <a:t>24.11.2019</a:t>
+              <a:t>25.11.2019</a:t>
             </a:fld>
             <a:endParaRPr lang="nb-NO"/>
           </a:p>
@@ -674,7 +676,7 @@
             <a:fld id="{C2CE8716-5A65-419C-B362-21FC49941D8F}" type="datetimeFigureOut">
               <a:rPr lang="nb-NO" smtClean="0"/>
               <a:pPr/>
-              <a:t>24.11.2019</a:t>
+              <a:t>25.11.2019</a:t>
             </a:fld>
             <a:endParaRPr lang="nb-NO"/>
           </a:p>
@@ -839,7 +841,7 @@
             <a:fld id="{C2CE8716-5A65-419C-B362-21FC49941D8F}" type="datetimeFigureOut">
               <a:rPr lang="nb-NO" smtClean="0"/>
               <a:pPr/>
-              <a:t>24.11.2019</a:t>
+              <a:t>25.11.2019</a:t>
             </a:fld>
             <a:endParaRPr lang="nb-NO"/>
           </a:p>
@@ -1081,7 +1083,7 @@
             <a:fld id="{C2CE8716-5A65-419C-B362-21FC49941D8F}" type="datetimeFigureOut">
               <a:rPr lang="nb-NO" smtClean="0"/>
               <a:pPr/>
-              <a:t>24.11.2019</a:t>
+              <a:t>25.11.2019</a:t>
             </a:fld>
             <a:endParaRPr lang="nb-NO"/>
           </a:p>
@@ -1363,7 +1365,7 @@
             <a:fld id="{C2CE8716-5A65-419C-B362-21FC49941D8F}" type="datetimeFigureOut">
               <a:rPr lang="nb-NO" smtClean="0"/>
               <a:pPr/>
-              <a:t>24.11.2019</a:t>
+              <a:t>25.11.2019</a:t>
             </a:fld>
             <a:endParaRPr lang="nb-NO"/>
           </a:p>
@@ -1779,7 +1781,7 @@
             <a:fld id="{C2CE8716-5A65-419C-B362-21FC49941D8F}" type="datetimeFigureOut">
               <a:rPr lang="nb-NO" smtClean="0"/>
               <a:pPr/>
-              <a:t>24.11.2019</a:t>
+              <a:t>25.11.2019</a:t>
             </a:fld>
             <a:endParaRPr lang="nb-NO"/>
           </a:p>
@@ -1893,7 +1895,7 @@
             <a:fld id="{C2CE8716-5A65-419C-B362-21FC49941D8F}" type="datetimeFigureOut">
               <a:rPr lang="nb-NO" smtClean="0"/>
               <a:pPr/>
-              <a:t>24.11.2019</a:t>
+              <a:t>25.11.2019</a:t>
             </a:fld>
             <a:endParaRPr lang="nb-NO"/>
           </a:p>
@@ -1985,7 +1987,7 @@
             <a:fld id="{C2CE8716-5A65-419C-B362-21FC49941D8F}" type="datetimeFigureOut">
               <a:rPr lang="nb-NO" smtClean="0"/>
               <a:pPr/>
-              <a:t>24.11.2019</a:t>
+              <a:t>25.11.2019</a:t>
             </a:fld>
             <a:endParaRPr lang="nb-NO"/>
           </a:p>
@@ -2257,7 +2259,7 @@
             <a:fld id="{C2CE8716-5A65-419C-B362-21FC49941D8F}" type="datetimeFigureOut">
               <a:rPr lang="nb-NO" smtClean="0"/>
               <a:pPr/>
-              <a:t>24.11.2019</a:t>
+              <a:t>25.11.2019</a:t>
             </a:fld>
             <a:endParaRPr lang="nb-NO"/>
           </a:p>
@@ -2506,7 +2508,7 @@
             <a:fld id="{C2CE8716-5A65-419C-B362-21FC49941D8F}" type="datetimeFigureOut">
               <a:rPr lang="nb-NO" smtClean="0"/>
               <a:pPr/>
-              <a:t>24.11.2019</a:t>
+              <a:t>25.11.2019</a:t>
             </a:fld>
             <a:endParaRPr lang="nb-NO"/>
           </a:p>
@@ -2714,7 +2716,7 @@
             <a:fld id="{C2CE8716-5A65-419C-B362-21FC49941D8F}" type="datetimeFigureOut">
               <a:rPr lang="nb-NO" smtClean="0"/>
               <a:pPr/>
-              <a:t>24.11.2019</a:t>
+              <a:t>25.11.2019</a:t>
             </a:fld>
             <a:endParaRPr lang="nb-NO"/>
           </a:p>
@@ -33444,6 +33446,1461 @@
 </p:sld>
 </file>
 
+<file path=ppt/slides/slide33.xml><?xml version="1.0" encoding="utf-8"?>
+<p:sld xmlns:a="http://schemas.openxmlformats.org/drawingml/2006/main" xmlns:r="http://schemas.openxmlformats.org/officeDocument/2006/relationships" xmlns:p="http://schemas.openxmlformats.org/presentationml/2006/main">
+  <p:cSld>
+    <p:spTree>
+      <p:nvGrpSpPr>
+        <p:cNvPr id="1" name=""/>
+        <p:cNvGrpSpPr/>
+        <p:nvPr/>
+      </p:nvGrpSpPr>
+      <p:grpSpPr>
+        <a:xfrm>
+          <a:off x="0" y="0"/>
+          <a:ext cx="0" cy="0"/>
+          <a:chOff x="0" y="0"/>
+          <a:chExt cx="0" cy="0"/>
+        </a:xfrm>
+      </p:grpSpPr>
+      <p:pic>
+        <p:nvPicPr>
+          <p:cNvPr id="4" name="Bilde 3" descr="lite fly til illsutrasjoner.png"/>
+          <p:cNvPicPr>
+            <a:picLocks noChangeAspect="1"/>
+          </p:cNvPicPr>
+          <p:nvPr/>
+        </p:nvPicPr>
+        <p:blipFill>
+          <a:blip r:embed="rId2" cstate="print"/>
+          <a:stretch>
+            <a:fillRect/>
+          </a:stretch>
+        </p:blipFill>
+        <p:spPr>
+          <a:xfrm>
+            <a:off x="2411760" y="2924944"/>
+            <a:ext cx="883658" cy="764704"/>
+          </a:xfrm>
+          <a:prstGeom prst="rect">
+            <a:avLst/>
+          </a:prstGeom>
+        </p:spPr>
+      </p:pic>
+      <p:pic>
+        <p:nvPicPr>
+          <p:cNvPr id="5" name="Bilde 4" descr="lite fly til illsutrasjoner fra siden.png"/>
+          <p:cNvPicPr>
+            <a:picLocks noChangeAspect="1"/>
+          </p:cNvPicPr>
+          <p:nvPr/>
+        </p:nvPicPr>
+        <p:blipFill>
+          <a:blip r:embed="rId3" cstate="print"/>
+          <a:stretch>
+            <a:fillRect/>
+          </a:stretch>
+        </p:blipFill>
+        <p:spPr>
+          <a:xfrm>
+            <a:off x="4139952" y="3429000"/>
+            <a:ext cx="1043608" cy="238073"/>
+          </a:xfrm>
+          <a:prstGeom prst="rect">
+            <a:avLst/>
+          </a:prstGeom>
+        </p:spPr>
+      </p:pic>
+      <p:pic>
+        <p:nvPicPr>
+          <p:cNvPr id="6" name="Bilde 5" descr="Ka50 overnfra illsutrasjon.png"/>
+          <p:cNvPicPr>
+            <a:picLocks noChangeAspect="1"/>
+          </p:cNvPicPr>
+          <p:nvPr/>
+        </p:nvPicPr>
+        <p:blipFill>
+          <a:blip r:embed="rId4" cstate="print"/>
+          <a:stretch>
+            <a:fillRect/>
+          </a:stretch>
+        </p:blipFill>
+        <p:spPr>
+          <a:xfrm>
+            <a:off x="2483768" y="4149080"/>
+            <a:ext cx="723662" cy="720080"/>
+          </a:xfrm>
+          <a:prstGeom prst="rect">
+            <a:avLst/>
+          </a:prstGeom>
+        </p:spPr>
+      </p:pic>
+      <p:pic>
+        <p:nvPicPr>
+          <p:cNvPr id="7" name="Bilde 6" descr="Ka50 side illsutrasjon.png"/>
+          <p:cNvPicPr>
+            <a:picLocks noChangeAspect="1"/>
+          </p:cNvPicPr>
+          <p:nvPr/>
+        </p:nvPicPr>
+        <p:blipFill>
+          <a:blip r:embed="rId5" cstate="print"/>
+          <a:stretch>
+            <a:fillRect/>
+          </a:stretch>
+        </p:blipFill>
+        <p:spPr>
+          <a:xfrm>
+            <a:off x="3923928" y="4293096"/>
+            <a:ext cx="1195143" cy="412748"/>
+          </a:xfrm>
+          <a:prstGeom prst="rect">
+            <a:avLst/>
+          </a:prstGeom>
+        </p:spPr>
+      </p:pic>
+      <p:pic>
+        <p:nvPicPr>
+          <p:cNvPr id="9" name="Bilde 8" descr="F14 above.png"/>
+          <p:cNvPicPr>
+            <a:picLocks noChangeAspect="1"/>
+          </p:cNvPicPr>
+          <p:nvPr/>
+        </p:nvPicPr>
+        <p:blipFill>
+          <a:blip r:embed="rId6" cstate="print"/>
+          <a:stretch>
+            <a:fillRect/>
+          </a:stretch>
+        </p:blipFill>
+        <p:spPr>
+          <a:xfrm>
+            <a:off x="2123728" y="1340768"/>
+            <a:ext cx="1174958" cy="1152128"/>
+          </a:xfrm>
+          <a:prstGeom prst="rect">
+            <a:avLst/>
+          </a:prstGeom>
+        </p:spPr>
+      </p:pic>
+      <p:pic>
+        <p:nvPicPr>
+          <p:cNvPr id="10" name="Bilde 9" descr="F14 silhouette.png"/>
+          <p:cNvPicPr>
+            <a:picLocks noChangeAspect="1"/>
+          </p:cNvPicPr>
+          <p:nvPr/>
+        </p:nvPicPr>
+        <p:blipFill>
+          <a:blip r:embed="rId7" cstate="print"/>
+          <a:stretch>
+            <a:fillRect/>
+          </a:stretch>
+        </p:blipFill>
+        <p:spPr>
+          <a:xfrm>
+            <a:off x="3707904" y="1988840"/>
+            <a:ext cx="2187690" cy="592822"/>
+          </a:xfrm>
+          <a:prstGeom prst="rect">
+            <a:avLst/>
+          </a:prstGeom>
+        </p:spPr>
+      </p:pic>
+      <p:pic>
+        <p:nvPicPr>
+          <p:cNvPr id="11" name="Bilde 10" descr="F16 above.png"/>
+          <p:cNvPicPr>
+            <a:picLocks noChangeAspect="1"/>
+          </p:cNvPicPr>
+          <p:nvPr/>
+        </p:nvPicPr>
+        <p:blipFill>
+          <a:blip r:embed="rId8" cstate="print"/>
+          <a:stretch>
+            <a:fillRect/>
+          </a:stretch>
+        </p:blipFill>
+        <p:spPr>
+          <a:xfrm>
+            <a:off x="2339752" y="332656"/>
+            <a:ext cx="784223" cy="1008112"/>
+          </a:xfrm>
+          <a:prstGeom prst="rect">
+            <a:avLst/>
+          </a:prstGeom>
+        </p:spPr>
+      </p:pic>
+      <p:pic>
+        <p:nvPicPr>
+          <p:cNvPr id="12" name="Bilde 11" descr="F16 silhouette.png"/>
+          <p:cNvPicPr>
+            <a:picLocks noChangeAspect="1"/>
+          </p:cNvPicPr>
+          <p:nvPr/>
+        </p:nvPicPr>
+        <p:blipFill>
+          <a:blip r:embed="rId9" cstate="print"/>
+          <a:stretch>
+            <a:fillRect/>
+          </a:stretch>
+        </p:blipFill>
+        <p:spPr>
+          <a:xfrm>
+            <a:off x="3707904" y="260648"/>
+            <a:ext cx="2187691" cy="1239749"/>
+          </a:xfrm>
+          <a:prstGeom prst="rect">
+            <a:avLst/>
+          </a:prstGeom>
+        </p:spPr>
+      </p:pic>
+    </p:spTree>
+    <p:extLst>
+      <p:ext uri="{BB962C8B-B14F-4D97-AF65-F5344CB8AC3E}">
+        <p14:creationId xmlns:p14="http://schemas.microsoft.com/office/powerpoint/2010/main" val="3611620817"/>
+      </p:ext>
+    </p:extLst>
+  </p:cSld>
+  <p:clrMapOvr>
+    <a:masterClrMapping/>
+  </p:clrMapOvr>
+</p:sld>
+</file>
+
+<file path=ppt/slides/slide34.xml><?xml version="1.0" encoding="utf-8"?>
+<p:sld xmlns:a="http://schemas.openxmlformats.org/drawingml/2006/main" xmlns:r="http://schemas.openxmlformats.org/officeDocument/2006/relationships" xmlns:p="http://schemas.openxmlformats.org/presentationml/2006/main">
+  <p:cSld>
+    <p:spTree>
+      <p:nvGrpSpPr>
+        <p:cNvPr id="1" name=""/>
+        <p:cNvGrpSpPr/>
+        <p:nvPr/>
+      </p:nvGrpSpPr>
+      <p:grpSpPr>
+        <a:xfrm>
+          <a:off x="0" y="0"/>
+          <a:ext cx="0" cy="0"/>
+          <a:chOff x="0" y="0"/>
+          <a:chExt cx="0" cy="0"/>
+        </a:xfrm>
+      </p:grpSpPr>
+      <p:sp>
+        <p:nvSpPr>
+          <p:cNvPr id="3" name="Likebent trekant 2">
+            <a:extLst>
+              <a:ext uri="{FF2B5EF4-FFF2-40B4-BE49-F238E27FC236}">
+                <a16:creationId xmlns:a16="http://schemas.microsoft.com/office/drawing/2014/main" id="{B04ECB0A-D434-4B60-A0C5-F29B3AE16A86}"/>
+              </a:ext>
+            </a:extLst>
+          </p:cNvPr>
+          <p:cNvSpPr/>
+          <p:nvPr/>
+        </p:nvSpPr>
+        <p:spPr>
+          <a:xfrm>
+            <a:off x="3923928" y="1340768"/>
+            <a:ext cx="144016" cy="144016"/>
+          </a:xfrm>
+          <a:prstGeom prst="triangle">
+            <a:avLst/>
+          </a:prstGeom>
+          <a:solidFill>
+            <a:srgbClr val="FF0000"/>
+          </a:solidFill>
+          <a:ln w="6350">
+            <a:solidFill>
+              <a:schemeClr val="tx1"/>
+            </a:solidFill>
+          </a:ln>
+        </p:spPr>
+        <p:style>
+          <a:lnRef idx="2">
+            <a:schemeClr val="accent1">
+              <a:shade val="50000"/>
+            </a:schemeClr>
+          </a:lnRef>
+          <a:fillRef idx="1">
+            <a:schemeClr val="accent1"/>
+          </a:fillRef>
+          <a:effectRef idx="0">
+            <a:schemeClr val="accent1"/>
+          </a:effectRef>
+          <a:fontRef idx="minor">
+            <a:schemeClr val="lt1"/>
+          </a:fontRef>
+        </p:style>
+        <p:txBody>
+          <a:bodyPr rtlCol="0" anchor="ctr"/>
+          <a:lstStyle/>
+          <a:p>
+            <a:pPr algn="ctr"/>
+            <a:endParaRPr lang="nb-NO"/>
+          </a:p>
+        </p:txBody>
+      </p:sp>
+      <p:cxnSp>
+        <p:nvCxnSpPr>
+          <p:cNvPr id="5" name="Rett pil 94">
+            <a:extLst>
+              <a:ext uri="{FF2B5EF4-FFF2-40B4-BE49-F238E27FC236}">
+                <a16:creationId xmlns:a16="http://schemas.microsoft.com/office/drawing/2014/main" id="{289F5DF3-FB20-4055-91CB-FEA0637743FF}"/>
+              </a:ext>
+            </a:extLst>
+          </p:cNvPr>
+          <p:cNvCxnSpPr>
+            <a:cxnSpLocks/>
+          </p:cNvCxnSpPr>
+          <p:nvPr/>
+        </p:nvCxnSpPr>
+        <p:spPr>
+          <a:xfrm flipV="1">
+            <a:off x="3995936" y="3145396"/>
+            <a:ext cx="0" cy="3045242"/>
+          </a:xfrm>
+          <a:prstGeom prst="straightConnector1">
+            <a:avLst/>
+          </a:prstGeom>
+          <a:ln w="25400">
+            <a:solidFill>
+              <a:srgbClr val="0F01C7"/>
+            </a:solidFill>
+            <a:tailEnd type="arrow"/>
+          </a:ln>
+        </p:spPr>
+        <p:style>
+          <a:lnRef idx="1">
+            <a:schemeClr val="accent1"/>
+          </a:lnRef>
+          <a:fillRef idx="0">
+            <a:schemeClr val="accent1"/>
+          </a:fillRef>
+          <a:effectRef idx="0">
+            <a:schemeClr val="accent1"/>
+          </a:effectRef>
+          <a:fontRef idx="minor">
+            <a:schemeClr val="tx1"/>
+          </a:fontRef>
+        </p:style>
+      </p:cxnSp>
+      <p:sp>
+        <p:nvSpPr>
+          <p:cNvPr id="6" name="Bue 5">
+            <a:extLst>
+              <a:ext uri="{FF2B5EF4-FFF2-40B4-BE49-F238E27FC236}">
+                <a16:creationId xmlns:a16="http://schemas.microsoft.com/office/drawing/2014/main" id="{29295DA4-D53A-4F93-B4A8-32E111244AF8}"/>
+              </a:ext>
+            </a:extLst>
+          </p:cNvPr>
+          <p:cNvSpPr/>
+          <p:nvPr/>
+        </p:nvSpPr>
+        <p:spPr>
+          <a:xfrm rot="8952496" flipV="1">
+            <a:off x="3982338" y="2003333"/>
+            <a:ext cx="1855474" cy="1727590"/>
+          </a:xfrm>
+          <a:prstGeom prst="arc">
+            <a:avLst>
+              <a:gd name="adj1" fmla="val 8843459"/>
+              <a:gd name="adj2" fmla="val 20087448"/>
+            </a:avLst>
+          </a:prstGeom>
+          <a:ln w="25400">
+            <a:solidFill>
+              <a:srgbClr val="0F01C7"/>
+            </a:solidFill>
+            <a:headEnd type="arrow"/>
+            <a:tailEnd type="none"/>
+          </a:ln>
+        </p:spPr>
+        <p:style>
+          <a:lnRef idx="1">
+            <a:schemeClr val="accent1"/>
+          </a:lnRef>
+          <a:fillRef idx="0">
+            <a:schemeClr val="accent1"/>
+          </a:fillRef>
+          <a:effectRef idx="0">
+            <a:schemeClr val="accent1"/>
+          </a:effectRef>
+          <a:fontRef idx="minor">
+            <a:schemeClr val="tx1"/>
+          </a:fontRef>
+        </p:style>
+        <p:txBody>
+          <a:bodyPr rtlCol="0" anchor="ctr"/>
+          <a:lstStyle/>
+          <a:p>
+            <a:pPr algn="ctr"/>
+            <a:endParaRPr lang="nb-NO"/>
+          </a:p>
+        </p:txBody>
+      </p:sp>
+      <p:sp>
+        <p:nvSpPr>
+          <p:cNvPr id="7" name="TekstSylinder 6">
+            <a:extLst>
+              <a:ext uri="{FF2B5EF4-FFF2-40B4-BE49-F238E27FC236}">
+                <a16:creationId xmlns:a16="http://schemas.microsoft.com/office/drawing/2014/main" id="{544B1DEC-E3B6-4359-B75E-F30B592ECD5C}"/>
+              </a:ext>
+            </a:extLst>
+          </p:cNvPr>
+          <p:cNvSpPr txBox="1"/>
+          <p:nvPr/>
+        </p:nvSpPr>
+        <p:spPr>
+          <a:xfrm>
+            <a:off x="3995936" y="2918264"/>
+            <a:ext cx="360040" cy="246221"/>
+          </a:xfrm>
+          <a:prstGeom prst="rect">
+            <a:avLst/>
+          </a:prstGeom>
+          <a:noFill/>
+        </p:spPr>
+        <p:txBody>
+          <a:bodyPr wrap="square" rtlCol="0">
+            <a:spAutoFit/>
+          </a:bodyPr>
+          <a:lstStyle/>
+          <a:p>
+            <a:r>
+              <a:rPr lang="nb-NO" sz="1000" b="1" dirty="0">
+                <a:solidFill>
+                  <a:srgbClr val="0F01C7"/>
+                </a:solidFill>
+                <a:latin typeface="Arial Narrow" pitchFamily="34" charset="0"/>
+              </a:rPr>
+              <a:t>A</a:t>
+            </a:r>
+          </a:p>
+        </p:txBody>
+      </p:sp>
+      <p:sp>
+        <p:nvSpPr>
+          <p:cNvPr id="8" name="TekstSylinder 7">
+            <a:extLst>
+              <a:ext uri="{FF2B5EF4-FFF2-40B4-BE49-F238E27FC236}">
+                <a16:creationId xmlns:a16="http://schemas.microsoft.com/office/drawing/2014/main" id="{A38A7398-7E31-4E10-B5EC-848175384361}"/>
+              </a:ext>
+            </a:extLst>
+          </p:cNvPr>
+          <p:cNvSpPr txBox="1"/>
+          <p:nvPr/>
+        </p:nvSpPr>
+        <p:spPr>
+          <a:xfrm>
+            <a:off x="4769180" y="2129969"/>
+            <a:ext cx="360040" cy="246221"/>
+          </a:xfrm>
+          <a:prstGeom prst="rect">
+            <a:avLst/>
+          </a:prstGeom>
+          <a:noFill/>
+        </p:spPr>
+        <p:txBody>
+          <a:bodyPr wrap="square" rtlCol="0">
+            <a:spAutoFit/>
+          </a:bodyPr>
+          <a:lstStyle/>
+          <a:p>
+            <a:r>
+              <a:rPr lang="nb-NO" sz="1000" b="1" dirty="0">
+                <a:solidFill>
+                  <a:srgbClr val="0F01C7"/>
+                </a:solidFill>
+                <a:latin typeface="Arial Narrow" pitchFamily="34" charset="0"/>
+              </a:rPr>
+              <a:t>C</a:t>
+            </a:r>
+          </a:p>
+        </p:txBody>
+      </p:sp>
+      <p:cxnSp>
+        <p:nvCxnSpPr>
+          <p:cNvPr id="10" name="Rett linje 9">
+            <a:extLst>
+              <a:ext uri="{FF2B5EF4-FFF2-40B4-BE49-F238E27FC236}">
+                <a16:creationId xmlns:a16="http://schemas.microsoft.com/office/drawing/2014/main" id="{3691A1F4-68D6-4AE1-B695-538DD4142DF9}"/>
+              </a:ext>
+            </a:extLst>
+          </p:cNvPr>
+          <p:cNvCxnSpPr>
+            <a:cxnSpLocks/>
+          </p:cNvCxnSpPr>
+          <p:nvPr/>
+        </p:nvCxnSpPr>
+        <p:spPr>
+          <a:xfrm flipH="1" flipV="1">
+            <a:off x="4001731" y="2481498"/>
+            <a:ext cx="172521" cy="98852"/>
+          </a:xfrm>
+          <a:prstGeom prst="line">
+            <a:avLst/>
+          </a:prstGeom>
+          <a:ln w="25400">
+            <a:solidFill>
+              <a:srgbClr val="0F01C7"/>
+            </a:solidFill>
+          </a:ln>
+        </p:spPr>
+        <p:style>
+          <a:lnRef idx="1">
+            <a:schemeClr val="accent1"/>
+          </a:lnRef>
+          <a:fillRef idx="0">
+            <a:schemeClr val="accent1"/>
+          </a:fillRef>
+          <a:effectRef idx="0">
+            <a:schemeClr val="accent1"/>
+          </a:effectRef>
+          <a:fontRef idx="minor">
+            <a:schemeClr val="tx1"/>
+          </a:fontRef>
+        </p:style>
+      </p:cxnSp>
+      <p:cxnSp>
+        <p:nvCxnSpPr>
+          <p:cNvPr id="12" name="Rett linje 11">
+            <a:extLst>
+              <a:ext uri="{FF2B5EF4-FFF2-40B4-BE49-F238E27FC236}">
+                <a16:creationId xmlns:a16="http://schemas.microsoft.com/office/drawing/2014/main" id="{57928C5C-D0E9-41DA-8B2B-4D4805A4B7B0}"/>
+              </a:ext>
+            </a:extLst>
+          </p:cNvPr>
+          <p:cNvCxnSpPr>
+            <a:cxnSpLocks/>
+          </p:cNvCxnSpPr>
+          <p:nvPr/>
+        </p:nvCxnSpPr>
+        <p:spPr>
+          <a:xfrm flipH="1" flipV="1">
+            <a:off x="4920919" y="1916832"/>
+            <a:ext cx="1" cy="170860"/>
+          </a:xfrm>
+          <a:prstGeom prst="line">
+            <a:avLst/>
+          </a:prstGeom>
+          <a:ln w="25400">
+            <a:solidFill>
+              <a:srgbClr val="0F01C7"/>
+            </a:solidFill>
+          </a:ln>
+        </p:spPr>
+        <p:style>
+          <a:lnRef idx="1">
+            <a:schemeClr val="accent1"/>
+          </a:lnRef>
+          <a:fillRef idx="0">
+            <a:schemeClr val="accent1"/>
+          </a:fillRef>
+          <a:effectRef idx="0">
+            <a:schemeClr val="accent1"/>
+          </a:effectRef>
+          <a:fontRef idx="minor">
+            <a:schemeClr val="tx1"/>
+          </a:fontRef>
+        </p:style>
+      </p:cxnSp>
+      <p:sp>
+        <p:nvSpPr>
+          <p:cNvPr id="14" name="TekstSylinder 13">
+            <a:extLst>
+              <a:ext uri="{FF2B5EF4-FFF2-40B4-BE49-F238E27FC236}">
+                <a16:creationId xmlns:a16="http://schemas.microsoft.com/office/drawing/2014/main" id="{501358CA-BBBF-46AE-BFD7-C02117A442C6}"/>
+              </a:ext>
+            </a:extLst>
+          </p:cNvPr>
+          <p:cNvSpPr txBox="1"/>
+          <p:nvPr/>
+        </p:nvSpPr>
+        <p:spPr>
+          <a:xfrm>
+            <a:off x="4115079" y="2487572"/>
+            <a:ext cx="360040" cy="246221"/>
+          </a:xfrm>
+          <a:prstGeom prst="rect">
+            <a:avLst/>
+          </a:prstGeom>
+          <a:noFill/>
+        </p:spPr>
+        <p:txBody>
+          <a:bodyPr wrap="square" rtlCol="0">
+            <a:spAutoFit/>
+          </a:bodyPr>
+          <a:lstStyle/>
+          <a:p>
+            <a:r>
+              <a:rPr lang="nb-NO" sz="1000" b="1" dirty="0">
+                <a:solidFill>
+                  <a:srgbClr val="0F01C7"/>
+                </a:solidFill>
+                <a:latin typeface="Arial Narrow" pitchFamily="34" charset="0"/>
+              </a:rPr>
+              <a:t>B</a:t>
+            </a:r>
+          </a:p>
+        </p:txBody>
+      </p:sp>
+      <p:pic>
+        <p:nvPicPr>
+          <p:cNvPr id="2" name="Bilde 1" descr="F16 above.png">
+            <a:extLst>
+              <a:ext uri="{FF2B5EF4-FFF2-40B4-BE49-F238E27FC236}">
+                <a16:creationId xmlns:a16="http://schemas.microsoft.com/office/drawing/2014/main" id="{DA82CFCE-48FA-4C97-A1C3-FD8FD93D75AF}"/>
+              </a:ext>
+            </a:extLst>
+          </p:cNvPr>
+          <p:cNvPicPr>
+            <a:picLocks noChangeAspect="1"/>
+          </p:cNvPicPr>
+          <p:nvPr/>
+        </p:nvPicPr>
+        <p:blipFill>
+          <a:blip r:embed="rId2" cstate="print"/>
+          <a:stretch>
+            <a:fillRect/>
+          </a:stretch>
+        </p:blipFill>
+        <p:spPr>
+          <a:xfrm rot="8443870">
+            <a:off x="5304132" y="1916832"/>
+            <a:ext cx="516159" cy="663518"/>
+          </a:xfrm>
+          <a:prstGeom prst="rect">
+            <a:avLst/>
+          </a:prstGeom>
+        </p:spPr>
+      </p:pic>
+      <p:cxnSp>
+        <p:nvCxnSpPr>
+          <p:cNvPr id="16" name="Rett linje 15">
+            <a:extLst>
+              <a:ext uri="{FF2B5EF4-FFF2-40B4-BE49-F238E27FC236}">
+                <a16:creationId xmlns:a16="http://schemas.microsoft.com/office/drawing/2014/main" id="{16D17831-68E5-4CE1-9E02-7EBE8CE2579A}"/>
+              </a:ext>
+            </a:extLst>
+          </p:cNvPr>
+          <p:cNvCxnSpPr>
+            <a:cxnSpLocks/>
+            <a:stCxn id="3" idx="3"/>
+            <a:endCxn id="7" idx="1"/>
+          </p:cNvCxnSpPr>
+          <p:nvPr/>
+        </p:nvCxnSpPr>
+        <p:spPr>
+          <a:xfrm>
+            <a:off x="3995936" y="1484784"/>
+            <a:ext cx="0" cy="1556591"/>
+          </a:xfrm>
+          <a:prstGeom prst="line">
+            <a:avLst/>
+          </a:prstGeom>
+          <a:ln>
+            <a:solidFill>
+              <a:schemeClr val="tx1"/>
+            </a:solidFill>
+            <a:prstDash val="dash"/>
+          </a:ln>
+        </p:spPr>
+        <p:style>
+          <a:lnRef idx="1">
+            <a:schemeClr val="accent1"/>
+          </a:lnRef>
+          <a:fillRef idx="0">
+            <a:schemeClr val="accent1"/>
+          </a:fillRef>
+          <a:effectRef idx="0">
+            <a:schemeClr val="accent1"/>
+          </a:effectRef>
+          <a:fontRef idx="minor">
+            <a:schemeClr val="tx1"/>
+          </a:fontRef>
+        </p:style>
+      </p:cxnSp>
+      <p:sp>
+        <p:nvSpPr>
+          <p:cNvPr id="18" name="Likebent trekant 17">
+            <a:extLst>
+              <a:ext uri="{FF2B5EF4-FFF2-40B4-BE49-F238E27FC236}">
+                <a16:creationId xmlns:a16="http://schemas.microsoft.com/office/drawing/2014/main" id="{A6F3DCD0-15EC-42DE-AA4A-4B363CBF00B1}"/>
+              </a:ext>
+            </a:extLst>
+          </p:cNvPr>
+          <p:cNvSpPr/>
+          <p:nvPr/>
+        </p:nvSpPr>
+        <p:spPr>
+          <a:xfrm>
+            <a:off x="1429728" y="2376190"/>
+            <a:ext cx="144016" cy="144016"/>
+          </a:xfrm>
+          <a:prstGeom prst="triangle">
+            <a:avLst/>
+          </a:prstGeom>
+          <a:solidFill>
+            <a:schemeClr val="tx2"/>
+          </a:solidFill>
+          <a:ln w="6350">
+            <a:solidFill>
+              <a:schemeClr val="tx1"/>
+            </a:solidFill>
+          </a:ln>
+        </p:spPr>
+        <p:style>
+          <a:lnRef idx="2">
+            <a:schemeClr val="accent1">
+              <a:shade val="50000"/>
+            </a:schemeClr>
+          </a:lnRef>
+          <a:fillRef idx="1">
+            <a:schemeClr val="accent1"/>
+          </a:fillRef>
+          <a:effectRef idx="0">
+            <a:schemeClr val="accent1"/>
+          </a:effectRef>
+          <a:fontRef idx="minor">
+            <a:schemeClr val="lt1"/>
+          </a:fontRef>
+        </p:style>
+        <p:txBody>
+          <a:bodyPr rtlCol="0" anchor="ctr"/>
+          <a:lstStyle/>
+          <a:p>
+            <a:pPr algn="ctr"/>
+            <a:endParaRPr lang="nb-NO"/>
+          </a:p>
+        </p:txBody>
+      </p:sp>
+      <p:cxnSp>
+        <p:nvCxnSpPr>
+          <p:cNvPr id="19" name="Rett linje 18">
+            <a:extLst>
+              <a:ext uri="{FF2B5EF4-FFF2-40B4-BE49-F238E27FC236}">
+                <a16:creationId xmlns:a16="http://schemas.microsoft.com/office/drawing/2014/main" id="{A9871B2D-383B-4D60-BE9B-CF673FD4779E}"/>
+              </a:ext>
+            </a:extLst>
+          </p:cNvPr>
+          <p:cNvCxnSpPr>
+            <a:cxnSpLocks/>
+            <a:stCxn id="3" idx="3"/>
+            <a:endCxn id="18" idx="5"/>
+          </p:cNvCxnSpPr>
+          <p:nvPr/>
+        </p:nvCxnSpPr>
+        <p:spPr>
+          <a:xfrm flipH="1">
+            <a:off x="1537740" y="1484784"/>
+            <a:ext cx="2458196" cy="963414"/>
+          </a:xfrm>
+          <a:prstGeom prst="line">
+            <a:avLst/>
+          </a:prstGeom>
+          <a:ln w="15875">
+            <a:solidFill>
+              <a:schemeClr val="tx1"/>
+            </a:solidFill>
+            <a:prstDash val="lgDash"/>
+          </a:ln>
+        </p:spPr>
+        <p:style>
+          <a:lnRef idx="1">
+            <a:schemeClr val="accent1"/>
+          </a:lnRef>
+          <a:fillRef idx="0">
+            <a:schemeClr val="accent1"/>
+          </a:fillRef>
+          <a:effectRef idx="0">
+            <a:schemeClr val="accent1"/>
+          </a:effectRef>
+          <a:fontRef idx="minor">
+            <a:schemeClr val="tx1"/>
+          </a:fontRef>
+        </p:style>
+      </p:cxnSp>
+      <p:sp>
+        <p:nvSpPr>
+          <p:cNvPr id="22" name="TekstSylinder 21">
+            <a:extLst>
+              <a:ext uri="{FF2B5EF4-FFF2-40B4-BE49-F238E27FC236}">
+                <a16:creationId xmlns:a16="http://schemas.microsoft.com/office/drawing/2014/main" id="{CC170198-41D4-4F28-975D-CBB54D360743}"/>
+              </a:ext>
+            </a:extLst>
+          </p:cNvPr>
+          <p:cNvSpPr txBox="1"/>
+          <p:nvPr/>
+        </p:nvSpPr>
+        <p:spPr>
+          <a:xfrm>
+            <a:off x="4547048" y="3573016"/>
+            <a:ext cx="3564396" cy="3600400"/>
+          </a:xfrm>
+          <a:prstGeom prst="rect">
+            <a:avLst/>
+          </a:prstGeom>
+          <a:noFill/>
+        </p:spPr>
+        <p:txBody>
+          <a:bodyPr wrap="square" rtlCol="0">
+            <a:noAutofit/>
+          </a:bodyPr>
+          <a:lstStyle/>
+          <a:p>
+            <a:r>
+              <a:rPr lang="nb-NO" sz="1200" b="1" dirty="0"/>
+              <a:t>A: </a:t>
+            </a:r>
+            <a:r>
+              <a:rPr lang="nb-NO" sz="1200" dirty="0"/>
+              <a:t>Pilot </a:t>
+            </a:r>
+            <a:r>
+              <a:rPr lang="nb-NO" sz="1200" dirty="0" err="1"/>
+              <a:t>releases</a:t>
+            </a:r>
+            <a:r>
+              <a:rPr lang="nb-NO" sz="1200" dirty="0"/>
+              <a:t> his </a:t>
+            </a:r>
+            <a:r>
+              <a:rPr lang="nb-NO" sz="1200" dirty="0" err="1"/>
+              <a:t>weapon</a:t>
+            </a:r>
+            <a:r>
+              <a:rPr lang="nb-NO" sz="1200" dirty="0"/>
+              <a:t> and turns </a:t>
+            </a:r>
+            <a:r>
+              <a:rPr lang="nb-NO" sz="1200" dirty="0" err="1"/>
+              <a:t>away</a:t>
+            </a:r>
+            <a:endParaRPr lang="nb-NO" sz="1200" dirty="0"/>
+          </a:p>
+          <a:p>
+            <a:r>
+              <a:rPr lang="nb-NO" sz="1200" b="1" dirty="0"/>
+              <a:t>B: </a:t>
+            </a:r>
+            <a:r>
+              <a:rPr lang="nb-NO" sz="1200" dirty="0"/>
+              <a:t>Pilot </a:t>
+            </a:r>
+            <a:r>
+              <a:rPr lang="nb-NO" sz="1200" dirty="0" err="1"/>
+              <a:t>call</a:t>
+            </a:r>
+            <a:r>
+              <a:rPr lang="nb-NO" sz="1200" dirty="0"/>
+              <a:t> «10 </a:t>
+            </a:r>
+            <a:r>
+              <a:rPr lang="nb-NO" sz="1200" dirty="0" err="1"/>
+              <a:t>seconds</a:t>
+            </a:r>
+            <a:r>
+              <a:rPr lang="nb-NO" sz="1200" dirty="0"/>
+              <a:t>» </a:t>
+            </a:r>
+            <a:r>
+              <a:rPr lang="nb-NO" sz="1200" dirty="0" err="1"/>
+              <a:t>when</a:t>
+            </a:r>
+            <a:r>
+              <a:rPr lang="nb-NO" sz="1200" dirty="0"/>
+              <a:t> it is 10 </a:t>
+            </a:r>
+            <a:r>
+              <a:rPr lang="nb-NO" sz="1200" dirty="0" err="1"/>
+              <a:t>seconds</a:t>
+            </a:r>
+            <a:r>
+              <a:rPr lang="nb-NO" sz="1200" dirty="0"/>
+              <a:t> </a:t>
+            </a:r>
+            <a:r>
+              <a:rPr lang="nb-NO" sz="1200" dirty="0" err="1"/>
+              <a:t>until</a:t>
+            </a:r>
+            <a:r>
+              <a:rPr lang="nb-NO" sz="1200" dirty="0"/>
+              <a:t> </a:t>
+            </a:r>
+            <a:r>
+              <a:rPr lang="nb-NO" sz="1200" dirty="0" err="1"/>
+              <a:t>the</a:t>
+            </a:r>
+            <a:r>
+              <a:rPr lang="nb-NO" sz="1200" dirty="0"/>
+              <a:t> </a:t>
+            </a:r>
+            <a:r>
+              <a:rPr lang="nb-NO" sz="1200" dirty="0" err="1"/>
+              <a:t>ground</a:t>
+            </a:r>
+            <a:r>
+              <a:rPr lang="nb-NO" sz="1200" dirty="0"/>
+              <a:t> laser </a:t>
+            </a:r>
+            <a:r>
+              <a:rPr lang="nb-NO" sz="1200" dirty="0" err="1"/>
+              <a:t>should</a:t>
+            </a:r>
+            <a:r>
+              <a:rPr lang="nb-NO" sz="1200" dirty="0"/>
+              <a:t> be </a:t>
+            </a:r>
+            <a:r>
+              <a:rPr lang="nb-NO" sz="1200" dirty="0" err="1"/>
+              <a:t>started</a:t>
+            </a:r>
+            <a:r>
+              <a:rPr lang="nb-NO" sz="1200" dirty="0"/>
+              <a:t>. This serves as a </a:t>
+            </a:r>
+            <a:r>
+              <a:rPr lang="nb-NO" sz="1200" dirty="0" err="1"/>
+              <a:t>heads</a:t>
+            </a:r>
+            <a:r>
+              <a:rPr lang="nb-NO" sz="1200" dirty="0"/>
+              <a:t> up </a:t>
+            </a:r>
+            <a:r>
+              <a:rPr lang="nb-NO" sz="1200" dirty="0" err="1"/>
+              <a:t>call</a:t>
+            </a:r>
+            <a:r>
+              <a:rPr lang="nb-NO" sz="1200" dirty="0"/>
+              <a:t> to </a:t>
+            </a:r>
+            <a:r>
+              <a:rPr lang="nb-NO" sz="1200" dirty="0" err="1"/>
+              <a:t>the</a:t>
+            </a:r>
+            <a:r>
+              <a:rPr lang="nb-NO" sz="1200" dirty="0"/>
+              <a:t> laser operator </a:t>
+            </a:r>
+            <a:r>
+              <a:rPr lang="nb-NO" sz="1200" dirty="0" err="1"/>
+              <a:t>that</a:t>
+            </a:r>
+            <a:r>
+              <a:rPr lang="nb-NO" sz="1200" dirty="0"/>
+              <a:t> in 10 </a:t>
+            </a:r>
+            <a:r>
+              <a:rPr lang="nb-NO" sz="1200" dirty="0" err="1"/>
+              <a:t>seconds</a:t>
+            </a:r>
+            <a:r>
+              <a:rPr lang="nb-NO" sz="1200" dirty="0"/>
+              <a:t> </a:t>
+            </a:r>
+            <a:r>
+              <a:rPr lang="nb-NO" sz="1200" dirty="0" err="1"/>
+              <a:t>he</a:t>
+            </a:r>
+            <a:r>
+              <a:rPr lang="nb-NO" sz="1200" dirty="0"/>
+              <a:t> </a:t>
+            </a:r>
+            <a:r>
+              <a:rPr lang="nb-NO" sz="1200" dirty="0" err="1"/>
+              <a:t>will</a:t>
+            </a:r>
+            <a:r>
+              <a:rPr lang="nb-NO" sz="1200" dirty="0"/>
+              <a:t> </a:t>
+            </a:r>
+            <a:r>
+              <a:rPr lang="nb-NO" sz="1200" dirty="0" err="1"/>
+              <a:t>get</a:t>
+            </a:r>
+            <a:r>
+              <a:rPr lang="nb-NO" sz="1200" dirty="0"/>
+              <a:t> a laser </a:t>
+            </a:r>
+            <a:r>
+              <a:rPr lang="nb-NO" sz="1200" dirty="0" err="1"/>
+              <a:t>on</a:t>
+            </a:r>
+            <a:r>
+              <a:rPr lang="nb-NO" sz="1200" dirty="0"/>
+              <a:t> </a:t>
+            </a:r>
+            <a:r>
+              <a:rPr lang="nb-NO" sz="1200" dirty="0" err="1"/>
+              <a:t>call</a:t>
+            </a:r>
+            <a:r>
+              <a:rPr lang="nb-NO" sz="1200" dirty="0"/>
+              <a:t>.</a:t>
+            </a:r>
+          </a:p>
+          <a:p>
+            <a:r>
+              <a:rPr lang="nb-NO" sz="1200" b="1" dirty="0"/>
+              <a:t>C: </a:t>
+            </a:r>
+            <a:r>
+              <a:rPr lang="nb-NO" sz="1200" dirty="0"/>
+              <a:t>Pilot </a:t>
+            </a:r>
+            <a:r>
+              <a:rPr lang="nb-NO" sz="1200" dirty="0" err="1"/>
+              <a:t>call</a:t>
+            </a:r>
+            <a:r>
+              <a:rPr lang="nb-NO" sz="1200" dirty="0"/>
+              <a:t> «Laser </a:t>
+            </a:r>
+            <a:r>
+              <a:rPr lang="nb-NO" sz="1200" dirty="0" err="1"/>
+              <a:t>on</a:t>
+            </a:r>
+            <a:r>
+              <a:rPr lang="nb-NO" sz="1200" dirty="0"/>
+              <a:t>» </a:t>
+            </a:r>
+            <a:r>
+              <a:rPr lang="nb-NO" sz="1200" dirty="0" err="1"/>
+              <a:t>when</a:t>
+            </a:r>
+            <a:r>
+              <a:rPr lang="nb-NO" sz="1200" dirty="0"/>
+              <a:t> </a:t>
+            </a:r>
+            <a:r>
+              <a:rPr lang="nb-NO" sz="1200" dirty="0" err="1"/>
+              <a:t>ground</a:t>
+            </a:r>
+            <a:r>
+              <a:rPr lang="nb-NO" sz="1200" dirty="0"/>
+              <a:t> laser </a:t>
+            </a:r>
+            <a:r>
+              <a:rPr lang="nb-NO" sz="1200" dirty="0" err="1"/>
+              <a:t>should</a:t>
+            </a:r>
+            <a:r>
+              <a:rPr lang="nb-NO" sz="1200" dirty="0"/>
+              <a:t> be </a:t>
+            </a:r>
+            <a:r>
+              <a:rPr lang="nb-NO" sz="1200" dirty="0" err="1"/>
+              <a:t>started</a:t>
+            </a:r>
+            <a:r>
+              <a:rPr lang="nb-NO" sz="1200" dirty="0"/>
+              <a:t>. </a:t>
+            </a:r>
+            <a:r>
+              <a:rPr lang="nb-NO" sz="1200" dirty="0" err="1"/>
+              <a:t>Ground</a:t>
+            </a:r>
+            <a:r>
+              <a:rPr lang="nb-NO" sz="1200" dirty="0"/>
+              <a:t> laser </a:t>
+            </a:r>
+            <a:r>
+              <a:rPr lang="nb-NO" sz="1200" dirty="0" err="1"/>
+              <a:t>then</a:t>
+            </a:r>
+            <a:r>
+              <a:rPr lang="nb-NO" sz="1200" dirty="0"/>
+              <a:t> </a:t>
+            </a:r>
+            <a:r>
+              <a:rPr lang="nb-NO" sz="1200" dirty="0" err="1"/>
+              <a:t>replies</a:t>
+            </a:r>
+            <a:r>
+              <a:rPr lang="nb-NO" sz="1200" dirty="0"/>
+              <a:t> </a:t>
+            </a:r>
+            <a:r>
+              <a:rPr lang="nb-NO" sz="1200" dirty="0" err="1"/>
+              <a:t>with</a:t>
+            </a:r>
+            <a:r>
+              <a:rPr lang="nb-NO" sz="1200" dirty="0"/>
+              <a:t> «</a:t>
+            </a:r>
+            <a:r>
+              <a:rPr lang="nb-NO" sz="1200" dirty="0" err="1"/>
+              <a:t>lasing</a:t>
+            </a:r>
+            <a:r>
+              <a:rPr lang="nb-NO" sz="1200" dirty="0"/>
+              <a:t>» and have a </a:t>
+            </a:r>
+            <a:r>
+              <a:rPr lang="nb-NO" sz="1200" dirty="0" err="1"/>
+              <a:t>continous</a:t>
+            </a:r>
+            <a:r>
+              <a:rPr lang="nb-NO" sz="1200" dirty="0"/>
+              <a:t> </a:t>
+            </a:r>
+            <a:r>
+              <a:rPr lang="nb-NO" sz="1200" dirty="0" err="1"/>
+              <a:t>lasing</a:t>
+            </a:r>
+            <a:r>
+              <a:rPr lang="nb-NO" sz="1200" dirty="0"/>
+              <a:t> at </a:t>
+            </a:r>
+            <a:r>
+              <a:rPr lang="nb-NO" sz="1200" dirty="0" err="1"/>
+              <a:t>the</a:t>
+            </a:r>
+            <a:r>
+              <a:rPr lang="nb-NO" sz="1200" dirty="0"/>
+              <a:t> target </a:t>
+            </a:r>
+            <a:r>
+              <a:rPr lang="nb-NO" sz="1200" dirty="0" err="1"/>
+              <a:t>until</a:t>
+            </a:r>
+            <a:r>
+              <a:rPr lang="nb-NO" sz="1200" dirty="0"/>
+              <a:t> bomb </a:t>
+            </a:r>
+            <a:r>
+              <a:rPr lang="nb-NO" sz="1200" dirty="0" err="1"/>
+              <a:t>impact</a:t>
+            </a:r>
+            <a:r>
+              <a:rPr lang="nb-NO" sz="1200" dirty="0"/>
+              <a:t> or pilot </a:t>
+            </a:r>
+            <a:r>
+              <a:rPr lang="nb-NO" sz="1200" dirty="0" err="1"/>
+              <a:t>call</a:t>
+            </a:r>
+            <a:r>
+              <a:rPr lang="nb-NO" sz="1200" dirty="0"/>
+              <a:t> «</a:t>
+            </a:r>
+            <a:r>
+              <a:rPr lang="nb-NO" sz="1200" dirty="0" err="1"/>
+              <a:t>cease</a:t>
+            </a:r>
+            <a:r>
+              <a:rPr lang="nb-NO" sz="1200" dirty="0"/>
+              <a:t> laser» as a signal to stop </a:t>
+            </a:r>
+            <a:r>
+              <a:rPr lang="nb-NO" sz="1200" dirty="0" err="1"/>
+              <a:t>lasing</a:t>
+            </a:r>
+            <a:r>
+              <a:rPr lang="nb-NO" sz="1200" dirty="0"/>
+              <a:t>.</a:t>
+            </a:r>
+          </a:p>
+          <a:p>
+            <a:endParaRPr lang="nb-NO" sz="1200" dirty="0"/>
+          </a:p>
+          <a:p>
+            <a:r>
+              <a:rPr lang="nb-NO" sz="1200" dirty="0"/>
+              <a:t>NOTE: Attacks </a:t>
+            </a:r>
+            <a:r>
+              <a:rPr lang="nb-NO" sz="1200" dirty="0" err="1"/>
+              <a:t>should</a:t>
+            </a:r>
+            <a:r>
+              <a:rPr lang="nb-NO" sz="1200" dirty="0"/>
+              <a:t> </a:t>
+            </a:r>
+            <a:r>
+              <a:rPr lang="nb-NO" sz="1200" dirty="0" err="1"/>
+              <a:t>only</a:t>
+            </a:r>
+            <a:r>
+              <a:rPr lang="nb-NO" sz="1200" dirty="0"/>
+              <a:t> be </a:t>
+            </a:r>
+            <a:r>
+              <a:rPr lang="nb-NO" sz="1200" dirty="0" err="1"/>
+              <a:t>made</a:t>
+            </a:r>
+            <a:r>
+              <a:rPr lang="nb-NO" sz="1200" dirty="0"/>
+              <a:t> </a:t>
+            </a:r>
+            <a:r>
+              <a:rPr lang="nb-NO" sz="1200" dirty="0" err="1"/>
+              <a:t>within</a:t>
+            </a:r>
+            <a:r>
+              <a:rPr lang="nb-NO" sz="1200" dirty="0"/>
+              <a:t> a 10°- 60° </a:t>
+            </a:r>
+            <a:r>
+              <a:rPr lang="nb-NO" sz="1200" dirty="0" err="1"/>
+              <a:t>cone</a:t>
+            </a:r>
+            <a:r>
+              <a:rPr lang="nb-NO" sz="1200" dirty="0"/>
+              <a:t> </a:t>
+            </a:r>
+            <a:r>
+              <a:rPr lang="nb-NO" sz="1200" dirty="0" err="1"/>
+              <a:t>on</a:t>
+            </a:r>
+            <a:r>
+              <a:rPr lang="nb-NO" sz="1200" dirty="0"/>
+              <a:t> </a:t>
+            </a:r>
+            <a:r>
+              <a:rPr lang="nb-NO" sz="1200" dirty="0" err="1"/>
+              <a:t>either</a:t>
+            </a:r>
+            <a:r>
+              <a:rPr lang="nb-NO" sz="1200" dirty="0"/>
+              <a:t> </a:t>
+            </a:r>
+            <a:r>
+              <a:rPr lang="nb-NO" sz="1200" dirty="0" err="1"/>
+              <a:t>left</a:t>
+            </a:r>
+            <a:r>
+              <a:rPr lang="nb-NO" sz="1200" dirty="0"/>
+              <a:t> or right side </a:t>
+            </a:r>
+            <a:r>
+              <a:rPr lang="nb-NO" sz="1200" dirty="0" err="1"/>
+              <a:t>of</a:t>
+            </a:r>
+            <a:r>
+              <a:rPr lang="nb-NO" sz="1200" dirty="0"/>
+              <a:t> </a:t>
+            </a:r>
+            <a:r>
+              <a:rPr lang="nb-NO" sz="1200" dirty="0" err="1"/>
+              <a:t>the</a:t>
+            </a:r>
+            <a:r>
+              <a:rPr lang="nb-NO" sz="1200" dirty="0"/>
+              <a:t> </a:t>
+            </a:r>
+            <a:r>
+              <a:rPr lang="nb-NO" sz="1200" dirty="0" err="1"/>
+              <a:t>ground</a:t>
+            </a:r>
+            <a:r>
+              <a:rPr lang="nb-NO" sz="1200" dirty="0"/>
+              <a:t> laser.</a:t>
+            </a:r>
+          </a:p>
+        </p:txBody>
+      </p:sp>
+      <p:sp>
+        <p:nvSpPr>
+          <p:cNvPr id="23" name="Bue 22">
+            <a:extLst>
+              <a:ext uri="{FF2B5EF4-FFF2-40B4-BE49-F238E27FC236}">
+                <a16:creationId xmlns:a16="http://schemas.microsoft.com/office/drawing/2014/main" id="{CE732115-08E9-4DFF-B418-7CAB3908DC00}"/>
+              </a:ext>
+            </a:extLst>
+          </p:cNvPr>
+          <p:cNvSpPr/>
+          <p:nvPr/>
+        </p:nvSpPr>
+        <p:spPr>
+          <a:xfrm rot="10962115">
+            <a:off x="3684149" y="1374920"/>
+            <a:ext cx="614864" cy="547796"/>
+          </a:xfrm>
+          <a:prstGeom prst="arc">
+            <a:avLst/>
+          </a:prstGeom>
+          <a:ln w="34925">
+            <a:solidFill>
+              <a:schemeClr val="tx1"/>
+            </a:solidFill>
+          </a:ln>
+        </p:spPr>
+        <p:style>
+          <a:lnRef idx="1">
+            <a:schemeClr val="accent1"/>
+          </a:lnRef>
+          <a:fillRef idx="0">
+            <a:schemeClr val="accent1"/>
+          </a:fillRef>
+          <a:effectRef idx="0">
+            <a:schemeClr val="accent1"/>
+          </a:effectRef>
+          <a:fontRef idx="minor">
+            <a:schemeClr val="tx1"/>
+          </a:fontRef>
+        </p:style>
+        <p:txBody>
+          <a:bodyPr rtlCol="0" anchor="ctr"/>
+          <a:lstStyle/>
+          <a:p>
+            <a:pPr algn="ctr"/>
+            <a:endParaRPr lang="nb-NO"/>
+          </a:p>
+        </p:txBody>
+      </p:sp>
+      <p:sp>
+        <p:nvSpPr>
+          <p:cNvPr id="24" name="TekstSylinder 23">
+            <a:extLst>
+              <a:ext uri="{FF2B5EF4-FFF2-40B4-BE49-F238E27FC236}">
+                <a16:creationId xmlns:a16="http://schemas.microsoft.com/office/drawing/2014/main" id="{AC298FBD-136B-45C6-8789-EBEFB2631590}"/>
+              </a:ext>
+            </a:extLst>
+          </p:cNvPr>
+          <p:cNvSpPr txBox="1"/>
+          <p:nvPr/>
+        </p:nvSpPr>
+        <p:spPr>
+          <a:xfrm>
+            <a:off x="3288159" y="1852970"/>
+            <a:ext cx="797881" cy="276999"/>
+          </a:xfrm>
+          <a:prstGeom prst="rect">
+            <a:avLst/>
+          </a:prstGeom>
+          <a:noFill/>
+        </p:spPr>
+        <p:txBody>
+          <a:bodyPr wrap="square" rtlCol="0">
+            <a:spAutoFit/>
+          </a:bodyPr>
+          <a:lstStyle/>
+          <a:p>
+            <a:r>
+              <a:rPr lang="nb-NO" sz="1200" dirty="0"/>
+              <a:t>10-60°</a:t>
+            </a:r>
+          </a:p>
+        </p:txBody>
+      </p:sp>
+      <p:sp>
+        <p:nvSpPr>
+          <p:cNvPr id="25" name="TekstSylinder 24">
+            <a:extLst>
+              <a:ext uri="{FF2B5EF4-FFF2-40B4-BE49-F238E27FC236}">
+                <a16:creationId xmlns:a16="http://schemas.microsoft.com/office/drawing/2014/main" id="{253F5391-89A7-440B-B548-3BCFFCC3B225}"/>
+              </a:ext>
+            </a:extLst>
+          </p:cNvPr>
+          <p:cNvSpPr txBox="1"/>
+          <p:nvPr/>
+        </p:nvSpPr>
+        <p:spPr>
+          <a:xfrm>
+            <a:off x="781721" y="2607761"/>
+            <a:ext cx="1512038" cy="369332"/>
+          </a:xfrm>
+          <a:prstGeom prst="rect">
+            <a:avLst/>
+          </a:prstGeom>
+          <a:noFill/>
+        </p:spPr>
+        <p:txBody>
+          <a:bodyPr wrap="square" rtlCol="0">
+            <a:spAutoFit/>
+          </a:bodyPr>
+          <a:lstStyle/>
+          <a:p>
+            <a:r>
+              <a:rPr lang="nb-NO" dirty="0" err="1"/>
+              <a:t>Ground</a:t>
+            </a:r>
+            <a:r>
+              <a:rPr lang="nb-NO" dirty="0"/>
+              <a:t> laser</a:t>
+            </a:r>
+          </a:p>
+        </p:txBody>
+      </p:sp>
+      <p:sp>
+        <p:nvSpPr>
+          <p:cNvPr id="26" name="TekstSylinder 25">
+            <a:extLst>
+              <a:ext uri="{FF2B5EF4-FFF2-40B4-BE49-F238E27FC236}">
+                <a16:creationId xmlns:a16="http://schemas.microsoft.com/office/drawing/2014/main" id="{58712FC6-7D95-4B4F-86BD-26C8D046C3D5}"/>
+              </a:ext>
+            </a:extLst>
+          </p:cNvPr>
+          <p:cNvSpPr txBox="1"/>
+          <p:nvPr/>
+        </p:nvSpPr>
+        <p:spPr>
+          <a:xfrm>
+            <a:off x="323528" y="692696"/>
+            <a:ext cx="6840760" cy="307777"/>
+          </a:xfrm>
+          <a:prstGeom prst="rect">
+            <a:avLst/>
+          </a:prstGeom>
+          <a:noFill/>
+        </p:spPr>
+        <p:txBody>
+          <a:bodyPr wrap="square" rtlCol="0">
+            <a:spAutoFit/>
+          </a:bodyPr>
+          <a:lstStyle/>
+          <a:p>
+            <a:pPr algn="ctr"/>
+            <a:r>
+              <a:rPr lang="nb-NO" sz="1400" b="1" dirty="0" err="1">
+                <a:latin typeface="Arial Narrow" pitchFamily="34" charset="0"/>
+              </a:rPr>
+              <a:t>Ground</a:t>
+            </a:r>
+            <a:r>
+              <a:rPr lang="nb-NO" sz="1400" b="1" dirty="0">
+                <a:latin typeface="Arial Narrow" pitchFamily="34" charset="0"/>
+              </a:rPr>
+              <a:t> </a:t>
+            </a:r>
+            <a:r>
+              <a:rPr lang="nb-NO" sz="1400" b="1" dirty="0" err="1">
+                <a:latin typeface="Arial Narrow" pitchFamily="34" charset="0"/>
+              </a:rPr>
+              <a:t>lased</a:t>
+            </a:r>
+            <a:r>
+              <a:rPr lang="nb-NO" sz="1400" b="1" dirty="0">
+                <a:latin typeface="Arial Narrow" pitchFamily="34" charset="0"/>
+              </a:rPr>
+              <a:t> </a:t>
+            </a:r>
+            <a:r>
+              <a:rPr lang="nb-NO" sz="1400" b="1" dirty="0" err="1">
+                <a:latin typeface="Arial Narrow" pitchFamily="34" charset="0"/>
+              </a:rPr>
+              <a:t>delivery</a:t>
+            </a:r>
+            <a:endParaRPr lang="nb-NO" sz="1400" b="1" dirty="0">
+              <a:latin typeface="Arial Narrow" pitchFamily="34" charset="0"/>
+            </a:endParaRPr>
+          </a:p>
+        </p:txBody>
+      </p:sp>
+    </p:spTree>
+    <p:extLst>
+      <p:ext uri="{BB962C8B-B14F-4D97-AF65-F5344CB8AC3E}">
+        <p14:creationId xmlns:p14="http://schemas.microsoft.com/office/powerpoint/2010/main" val="3467176037"/>
+      </p:ext>
+    </p:extLst>
+  </p:cSld>
+  <p:clrMapOvr>
+    <a:masterClrMapping/>
+  </p:clrMapOvr>
+</p:sld>
+</file>
+
 <file path=ppt/slides/slide4.xml><?xml version="1.0" encoding="utf-8"?>
 <p:sld xmlns:a="http://schemas.openxmlformats.org/drawingml/2006/main" xmlns:r="http://schemas.openxmlformats.org/officeDocument/2006/relationships" xmlns:p="http://schemas.openxmlformats.org/presentationml/2006/main">
   <p:cSld>

</xml_diff>

<commit_message>
chg: Updated kneeboard, uploaded version 1.0
</commit_message>
<xml_diff>
--- a/Surface Attack Tactics/SAT Graphics.pptx
+++ b/Surface Attack Tactics/SAT Graphics.pptx
@@ -41,6 +41,7 @@
     <p:sldId id="286" r:id="rId35"/>
     <p:sldId id="291" r:id="rId36"/>
     <p:sldId id="290" r:id="rId37"/>
+    <p:sldId id="294" r:id="rId38"/>
   </p:sldIdLst>
   <p:sldSz cx="9144000" cy="6858000" type="screen4x3"/>
   <p:notesSz cx="6858000" cy="9144000"/>
@@ -141,7 +142,7 @@
   </p:defaultTextStyle>
   <p:extLst>
     <p:ext uri="{EFAFB233-063F-42B5-8137-9DF3F51BA10A}">
-      <p15:sldGuideLst xmlns:p15="http://schemas.microsoft.com/office/powerpoint/2012/main" xmlns="">
+      <p15:sldGuideLst xmlns="" xmlns:p15="http://schemas.microsoft.com/office/powerpoint/2012/main">
         <p15:guide id="1" orient="horz" pos="2160">
           <p15:clr>
             <a:srgbClr val="A4A3A4"/>
@@ -338,7 +339,7 @@
             <a:fld id="{C2CE8716-5A65-419C-B362-21FC49941D8F}" type="datetimeFigureOut">
               <a:rPr lang="nb-NO" smtClean="0"/>
               <a:pPr/>
-              <a:t>01.12.2019</a:t>
+              <a:t>13.12.2019</a:t>
             </a:fld>
             <a:endParaRPr lang="nb-NO"/>
           </a:p>
@@ -503,7 +504,7 @@
             <a:fld id="{C2CE8716-5A65-419C-B362-21FC49941D8F}" type="datetimeFigureOut">
               <a:rPr lang="nb-NO" smtClean="0"/>
               <a:pPr/>
-              <a:t>01.12.2019</a:t>
+              <a:t>13.12.2019</a:t>
             </a:fld>
             <a:endParaRPr lang="nb-NO"/>
           </a:p>
@@ -678,7 +679,7 @@
             <a:fld id="{C2CE8716-5A65-419C-B362-21FC49941D8F}" type="datetimeFigureOut">
               <a:rPr lang="nb-NO" smtClean="0"/>
               <a:pPr/>
-              <a:t>01.12.2019</a:t>
+              <a:t>13.12.2019</a:t>
             </a:fld>
             <a:endParaRPr lang="nb-NO"/>
           </a:p>
@@ -843,7 +844,7 @@
             <a:fld id="{C2CE8716-5A65-419C-B362-21FC49941D8F}" type="datetimeFigureOut">
               <a:rPr lang="nb-NO" smtClean="0"/>
               <a:pPr/>
-              <a:t>01.12.2019</a:t>
+              <a:t>13.12.2019</a:t>
             </a:fld>
             <a:endParaRPr lang="nb-NO"/>
           </a:p>
@@ -1085,7 +1086,7 @@
             <a:fld id="{C2CE8716-5A65-419C-B362-21FC49941D8F}" type="datetimeFigureOut">
               <a:rPr lang="nb-NO" smtClean="0"/>
               <a:pPr/>
-              <a:t>01.12.2019</a:t>
+              <a:t>13.12.2019</a:t>
             </a:fld>
             <a:endParaRPr lang="nb-NO"/>
           </a:p>
@@ -1367,7 +1368,7 @@
             <a:fld id="{C2CE8716-5A65-419C-B362-21FC49941D8F}" type="datetimeFigureOut">
               <a:rPr lang="nb-NO" smtClean="0"/>
               <a:pPr/>
-              <a:t>01.12.2019</a:t>
+              <a:t>13.12.2019</a:t>
             </a:fld>
             <a:endParaRPr lang="nb-NO"/>
           </a:p>
@@ -1783,7 +1784,7 @@
             <a:fld id="{C2CE8716-5A65-419C-B362-21FC49941D8F}" type="datetimeFigureOut">
               <a:rPr lang="nb-NO" smtClean="0"/>
               <a:pPr/>
-              <a:t>01.12.2019</a:t>
+              <a:t>13.12.2019</a:t>
             </a:fld>
             <a:endParaRPr lang="nb-NO"/>
           </a:p>
@@ -1897,7 +1898,7 @@
             <a:fld id="{C2CE8716-5A65-419C-B362-21FC49941D8F}" type="datetimeFigureOut">
               <a:rPr lang="nb-NO" smtClean="0"/>
               <a:pPr/>
-              <a:t>01.12.2019</a:t>
+              <a:t>13.12.2019</a:t>
             </a:fld>
             <a:endParaRPr lang="nb-NO"/>
           </a:p>
@@ -1989,7 +1990,7 @@
             <a:fld id="{C2CE8716-5A65-419C-B362-21FC49941D8F}" type="datetimeFigureOut">
               <a:rPr lang="nb-NO" smtClean="0"/>
               <a:pPr/>
-              <a:t>01.12.2019</a:t>
+              <a:t>13.12.2019</a:t>
             </a:fld>
             <a:endParaRPr lang="nb-NO"/>
           </a:p>
@@ -2261,7 +2262,7 @@
             <a:fld id="{C2CE8716-5A65-419C-B362-21FC49941D8F}" type="datetimeFigureOut">
               <a:rPr lang="nb-NO" smtClean="0"/>
               <a:pPr/>
-              <a:t>01.12.2019</a:t>
+              <a:t>13.12.2019</a:t>
             </a:fld>
             <a:endParaRPr lang="nb-NO"/>
           </a:p>
@@ -2510,7 +2511,7 @@
             <a:fld id="{C2CE8716-5A65-419C-B362-21FC49941D8F}" type="datetimeFigureOut">
               <a:rPr lang="nb-NO" smtClean="0"/>
               <a:pPr/>
-              <a:t>01.12.2019</a:t>
+              <a:t>13.12.2019</a:t>
             </a:fld>
             <a:endParaRPr lang="nb-NO"/>
           </a:p>
@@ -2718,7 +2719,7 @@
             <a:fld id="{C2CE8716-5A65-419C-B362-21FC49941D8F}" type="datetimeFigureOut">
               <a:rPr lang="nb-NO" smtClean="0"/>
               <a:pPr/>
-              <a:t>01.12.2019</a:t>
+              <a:t>13.12.2019</a:t>
             </a:fld>
             <a:endParaRPr lang="nb-NO"/>
           </a:p>
@@ -10221,28 +10222,28 @@
                 <a:gridCol w="925253">
                   <a:extLst>
                     <a:ext uri="{9D8B030D-6E8A-4147-A177-3AD203B41FA5}">
-                      <a16:colId xmlns:a16="http://schemas.microsoft.com/office/drawing/2014/main" xmlns="" val="20000"/>
+                      <a16:colId xmlns="" xmlns:a16="http://schemas.microsoft.com/office/drawing/2014/main" val="20000"/>
                     </a:ext>
                   </a:extLst>
                 </a:gridCol>
                 <a:gridCol w="1255701">
                   <a:extLst>
                     <a:ext uri="{9D8B030D-6E8A-4147-A177-3AD203B41FA5}">
-                      <a16:colId xmlns:a16="http://schemas.microsoft.com/office/drawing/2014/main" xmlns="" val="20001"/>
+                      <a16:colId xmlns="" xmlns:a16="http://schemas.microsoft.com/office/drawing/2014/main" val="20001"/>
                     </a:ext>
                   </a:extLst>
                 </a:gridCol>
                 <a:gridCol w="1387880">
                   <a:extLst>
                     <a:ext uri="{9D8B030D-6E8A-4147-A177-3AD203B41FA5}">
-                      <a16:colId xmlns:a16="http://schemas.microsoft.com/office/drawing/2014/main" xmlns="" val="20002"/>
+                      <a16:colId xmlns="" xmlns:a16="http://schemas.microsoft.com/office/drawing/2014/main" val="20002"/>
                     </a:ext>
                   </a:extLst>
                 </a:gridCol>
                 <a:gridCol w="1255701">
                   <a:extLst>
                     <a:ext uri="{9D8B030D-6E8A-4147-A177-3AD203B41FA5}">
-                      <a16:colId xmlns:a16="http://schemas.microsoft.com/office/drawing/2014/main" xmlns="" val="20003"/>
+                      <a16:colId xmlns="" xmlns:a16="http://schemas.microsoft.com/office/drawing/2014/main" val="20003"/>
                     </a:ext>
                   </a:extLst>
                 </a:gridCol>
@@ -10312,7 +10313,7 @@
                 </a:tc>
                 <a:extLst>
                   <a:ext uri="{0D108BD9-81ED-4DB2-BD59-A6C34878D82A}">
-                    <a16:rowId xmlns:a16="http://schemas.microsoft.com/office/drawing/2014/main" xmlns="" val="10000"/>
+                    <a16:rowId xmlns="" xmlns:a16="http://schemas.microsoft.com/office/drawing/2014/main" val="10000"/>
                   </a:ext>
                 </a:extLst>
               </a:tr>
@@ -10377,7 +10378,7 @@
                 </a:tc>
                 <a:extLst>
                   <a:ext uri="{0D108BD9-81ED-4DB2-BD59-A6C34878D82A}">
-                    <a16:rowId xmlns:a16="http://schemas.microsoft.com/office/drawing/2014/main" xmlns="" val="10001"/>
+                    <a16:rowId xmlns="" xmlns:a16="http://schemas.microsoft.com/office/drawing/2014/main" val="10001"/>
                   </a:ext>
                 </a:extLst>
               </a:tr>
@@ -10429,7 +10430,7 @@
                 </a:tc>
                 <a:extLst>
                   <a:ext uri="{0D108BD9-81ED-4DB2-BD59-A6C34878D82A}">
-                    <a16:rowId xmlns:a16="http://schemas.microsoft.com/office/drawing/2014/main" xmlns="" val="10002"/>
+                    <a16:rowId xmlns="" xmlns:a16="http://schemas.microsoft.com/office/drawing/2014/main" val="10002"/>
                   </a:ext>
                 </a:extLst>
               </a:tr>
@@ -10481,7 +10482,7 @@
                 </a:tc>
                 <a:extLst>
                   <a:ext uri="{0D108BD9-81ED-4DB2-BD59-A6C34878D82A}">
-                    <a16:rowId xmlns:a16="http://schemas.microsoft.com/office/drawing/2014/main" xmlns="" val="10003"/>
+                    <a16:rowId xmlns="" xmlns:a16="http://schemas.microsoft.com/office/drawing/2014/main" val="10003"/>
                   </a:ext>
                 </a:extLst>
               </a:tr>
@@ -10570,7 +10571,7 @@
           <p:nvPr>
             <p:extLst>
               <p:ext uri="{D42A27DB-BD31-4B8C-83A1-F6EECF244321}">
-                <p14:modId xmlns:p14="http://schemas.microsoft.com/office/powerpoint/2010/main" xmlns="" val="4152571152"/>
+                <p14:modId xmlns="" xmlns:p14="http://schemas.microsoft.com/office/powerpoint/2010/main" val="4152571152"/>
               </p:ext>
             </p:extLst>
           </p:nvPr>
@@ -10590,28 +10591,28 @@
                 <a:gridCol w="925253">
                   <a:extLst>
                     <a:ext uri="{9D8B030D-6E8A-4147-A177-3AD203B41FA5}">
-                      <a16:colId xmlns:a16="http://schemas.microsoft.com/office/drawing/2014/main" xmlns="" val="20000"/>
+                      <a16:colId xmlns="" xmlns:a16="http://schemas.microsoft.com/office/drawing/2014/main" val="20000"/>
                     </a:ext>
                   </a:extLst>
                 </a:gridCol>
                 <a:gridCol w="1255701">
                   <a:extLst>
                     <a:ext uri="{9D8B030D-6E8A-4147-A177-3AD203B41FA5}">
-                      <a16:colId xmlns:a16="http://schemas.microsoft.com/office/drawing/2014/main" xmlns="" val="20001"/>
+                      <a16:colId xmlns="" xmlns:a16="http://schemas.microsoft.com/office/drawing/2014/main" val="20001"/>
                     </a:ext>
                   </a:extLst>
                 </a:gridCol>
                 <a:gridCol w="1387880">
                   <a:extLst>
                     <a:ext uri="{9D8B030D-6E8A-4147-A177-3AD203B41FA5}">
-                      <a16:colId xmlns:a16="http://schemas.microsoft.com/office/drawing/2014/main" xmlns="" val="20002"/>
+                      <a16:colId xmlns="" xmlns:a16="http://schemas.microsoft.com/office/drawing/2014/main" val="20002"/>
                     </a:ext>
                   </a:extLst>
                 </a:gridCol>
                 <a:gridCol w="1255701">
                   <a:extLst>
                     <a:ext uri="{9D8B030D-6E8A-4147-A177-3AD203B41FA5}">
-                      <a16:colId xmlns:a16="http://schemas.microsoft.com/office/drawing/2014/main" xmlns="" val="20003"/>
+                      <a16:colId xmlns="" xmlns:a16="http://schemas.microsoft.com/office/drawing/2014/main" val="20003"/>
                     </a:ext>
                   </a:extLst>
                 </a:gridCol>
@@ -10681,7 +10682,7 @@
                 </a:tc>
                 <a:extLst>
                   <a:ext uri="{0D108BD9-81ED-4DB2-BD59-A6C34878D82A}">
-                    <a16:rowId xmlns:a16="http://schemas.microsoft.com/office/drawing/2014/main" xmlns="" val="10000"/>
+                    <a16:rowId xmlns="" xmlns:a16="http://schemas.microsoft.com/office/drawing/2014/main" val="10000"/>
                   </a:ext>
                 </a:extLst>
               </a:tr>
@@ -10746,7 +10747,7 @@
                 </a:tc>
                 <a:extLst>
                   <a:ext uri="{0D108BD9-81ED-4DB2-BD59-A6C34878D82A}">
-                    <a16:rowId xmlns:a16="http://schemas.microsoft.com/office/drawing/2014/main" xmlns="" val="10001"/>
+                    <a16:rowId xmlns="" xmlns:a16="http://schemas.microsoft.com/office/drawing/2014/main" val="10001"/>
                   </a:ext>
                 </a:extLst>
               </a:tr>
@@ -10798,7 +10799,7 @@
                 </a:tc>
                 <a:extLst>
                   <a:ext uri="{0D108BD9-81ED-4DB2-BD59-A6C34878D82A}">
-                    <a16:rowId xmlns:a16="http://schemas.microsoft.com/office/drawing/2014/main" xmlns="" val="10002"/>
+                    <a16:rowId xmlns="" xmlns:a16="http://schemas.microsoft.com/office/drawing/2014/main" val="10002"/>
                   </a:ext>
                 </a:extLst>
               </a:tr>
@@ -10850,7 +10851,7 @@
                 </a:tc>
                 <a:extLst>
                   <a:ext uri="{0D108BD9-81ED-4DB2-BD59-A6C34878D82A}">
-                    <a16:rowId xmlns:a16="http://schemas.microsoft.com/office/drawing/2014/main" xmlns="" val="10003"/>
+                    <a16:rowId xmlns="" xmlns:a16="http://schemas.microsoft.com/office/drawing/2014/main" val="10003"/>
                   </a:ext>
                 </a:extLst>
               </a:tr>
@@ -10887,28 +10888,28 @@
                 <a:gridCol w="925253">
                   <a:extLst>
                     <a:ext uri="{9D8B030D-6E8A-4147-A177-3AD203B41FA5}">
-                      <a16:colId xmlns:a16="http://schemas.microsoft.com/office/drawing/2014/main" xmlns="" val="20000"/>
+                      <a16:colId xmlns="" xmlns:a16="http://schemas.microsoft.com/office/drawing/2014/main" val="20000"/>
                     </a:ext>
                   </a:extLst>
                 </a:gridCol>
                 <a:gridCol w="1255701">
                   <a:extLst>
                     <a:ext uri="{9D8B030D-6E8A-4147-A177-3AD203B41FA5}">
-                      <a16:colId xmlns:a16="http://schemas.microsoft.com/office/drawing/2014/main" xmlns="" val="20001"/>
+                      <a16:colId xmlns="" xmlns:a16="http://schemas.microsoft.com/office/drawing/2014/main" val="20001"/>
                     </a:ext>
                   </a:extLst>
                 </a:gridCol>
                 <a:gridCol w="1387880">
                   <a:extLst>
                     <a:ext uri="{9D8B030D-6E8A-4147-A177-3AD203B41FA5}">
-                      <a16:colId xmlns:a16="http://schemas.microsoft.com/office/drawing/2014/main" xmlns="" val="20002"/>
+                      <a16:colId xmlns="" xmlns:a16="http://schemas.microsoft.com/office/drawing/2014/main" val="20002"/>
                     </a:ext>
                   </a:extLst>
                 </a:gridCol>
                 <a:gridCol w="1255701">
                   <a:extLst>
                     <a:ext uri="{9D8B030D-6E8A-4147-A177-3AD203B41FA5}">
-                      <a16:colId xmlns:a16="http://schemas.microsoft.com/office/drawing/2014/main" xmlns="" val="20003"/>
+                      <a16:colId xmlns="" xmlns:a16="http://schemas.microsoft.com/office/drawing/2014/main" val="20003"/>
                     </a:ext>
                   </a:extLst>
                 </a:gridCol>
@@ -10978,7 +10979,7 @@
                 </a:tc>
                 <a:extLst>
                   <a:ext uri="{0D108BD9-81ED-4DB2-BD59-A6C34878D82A}">
-                    <a16:rowId xmlns:a16="http://schemas.microsoft.com/office/drawing/2014/main" xmlns="" val="10000"/>
+                    <a16:rowId xmlns="" xmlns:a16="http://schemas.microsoft.com/office/drawing/2014/main" val="10000"/>
                   </a:ext>
                 </a:extLst>
               </a:tr>
@@ -11043,7 +11044,7 @@
                 </a:tc>
                 <a:extLst>
                   <a:ext uri="{0D108BD9-81ED-4DB2-BD59-A6C34878D82A}">
-                    <a16:rowId xmlns:a16="http://schemas.microsoft.com/office/drawing/2014/main" xmlns="" val="10001"/>
+                    <a16:rowId xmlns="" xmlns:a16="http://schemas.microsoft.com/office/drawing/2014/main" val="10001"/>
                   </a:ext>
                 </a:extLst>
               </a:tr>
@@ -11095,7 +11096,7 @@
                 </a:tc>
                 <a:extLst>
                   <a:ext uri="{0D108BD9-81ED-4DB2-BD59-A6C34878D82A}">
-                    <a16:rowId xmlns:a16="http://schemas.microsoft.com/office/drawing/2014/main" xmlns="" val="10002"/>
+                    <a16:rowId xmlns="" xmlns:a16="http://schemas.microsoft.com/office/drawing/2014/main" val="10002"/>
                   </a:ext>
                 </a:extLst>
               </a:tr>
@@ -11147,7 +11148,7 @@
                 </a:tc>
                 <a:extLst>
                   <a:ext uri="{0D108BD9-81ED-4DB2-BD59-A6C34878D82A}">
-                    <a16:rowId xmlns:a16="http://schemas.microsoft.com/office/drawing/2014/main" xmlns="" val="10003"/>
+                    <a16:rowId xmlns="" xmlns:a16="http://schemas.microsoft.com/office/drawing/2014/main" val="10003"/>
                   </a:ext>
                 </a:extLst>
               </a:tr>
@@ -11232,7 +11233,7 @@
           <p:cNvPr id="23" name="Bilde 22" descr="F16 silhouette.png">
             <a:extLst>
               <a:ext uri="{FF2B5EF4-FFF2-40B4-BE49-F238E27FC236}">
-                <a16:creationId xmlns:a16="http://schemas.microsoft.com/office/drawing/2014/main" xmlns="" id="{1FF819DC-3790-41A5-B4A1-5A75BC03A0FD}"/>
+                <a16:creationId xmlns="" xmlns:a16="http://schemas.microsoft.com/office/drawing/2014/main" id="{1FF819DC-3790-41A5-B4A1-5A75BC03A0FD}"/>
               </a:ext>
             </a:extLst>
           </p:cNvPr>
@@ -11262,7 +11263,7 @@
           <p:cNvPr id="24" name="Bilde 23" descr="F16 silhouette.png">
             <a:extLst>
               <a:ext uri="{FF2B5EF4-FFF2-40B4-BE49-F238E27FC236}">
-                <a16:creationId xmlns:a16="http://schemas.microsoft.com/office/drawing/2014/main" xmlns="" id="{E925A051-2077-4310-BC75-D97BDDDBB1D0}"/>
+                <a16:creationId xmlns="" xmlns:a16="http://schemas.microsoft.com/office/drawing/2014/main" id="{E925A051-2077-4310-BC75-D97BDDDBB1D0}"/>
               </a:ext>
             </a:extLst>
           </p:cNvPr>
@@ -11292,7 +11293,7 @@
           <p:cNvPr id="25" name="Bilde 24" descr="F16 silhouette.png">
             <a:extLst>
               <a:ext uri="{FF2B5EF4-FFF2-40B4-BE49-F238E27FC236}">
-                <a16:creationId xmlns:a16="http://schemas.microsoft.com/office/drawing/2014/main" xmlns="" id="{3BBD4265-8C7B-4F3D-87A2-4139E4BFE65D}"/>
+                <a16:creationId xmlns="" xmlns:a16="http://schemas.microsoft.com/office/drawing/2014/main" id="{3BBD4265-8C7B-4F3D-87A2-4139E4BFE65D}"/>
               </a:ext>
             </a:extLst>
           </p:cNvPr>
@@ -11371,28 +11372,28 @@
                 <a:gridCol w="925253">
                   <a:extLst>
                     <a:ext uri="{9D8B030D-6E8A-4147-A177-3AD203B41FA5}">
-                      <a16:colId xmlns:a16="http://schemas.microsoft.com/office/drawing/2014/main" xmlns="" val="20000"/>
+                      <a16:colId xmlns="" xmlns:a16="http://schemas.microsoft.com/office/drawing/2014/main" val="20000"/>
                     </a:ext>
                   </a:extLst>
                 </a:gridCol>
                 <a:gridCol w="1255701">
                   <a:extLst>
                     <a:ext uri="{9D8B030D-6E8A-4147-A177-3AD203B41FA5}">
-                      <a16:colId xmlns:a16="http://schemas.microsoft.com/office/drawing/2014/main" xmlns="" val="20001"/>
+                      <a16:colId xmlns="" xmlns:a16="http://schemas.microsoft.com/office/drawing/2014/main" val="20001"/>
                     </a:ext>
                   </a:extLst>
                 </a:gridCol>
                 <a:gridCol w="1387880">
                   <a:extLst>
                     <a:ext uri="{9D8B030D-6E8A-4147-A177-3AD203B41FA5}">
-                      <a16:colId xmlns:a16="http://schemas.microsoft.com/office/drawing/2014/main" xmlns="" val="20002"/>
+                      <a16:colId xmlns="" xmlns:a16="http://schemas.microsoft.com/office/drawing/2014/main" val="20002"/>
                     </a:ext>
                   </a:extLst>
                 </a:gridCol>
                 <a:gridCol w="1255701">
                   <a:extLst>
                     <a:ext uri="{9D8B030D-6E8A-4147-A177-3AD203B41FA5}">
-                      <a16:colId xmlns:a16="http://schemas.microsoft.com/office/drawing/2014/main" xmlns="" val="20003"/>
+                      <a16:colId xmlns="" xmlns:a16="http://schemas.microsoft.com/office/drawing/2014/main" val="20003"/>
                     </a:ext>
                   </a:extLst>
                 </a:gridCol>
@@ -11462,7 +11463,7 @@
                 </a:tc>
                 <a:extLst>
                   <a:ext uri="{0D108BD9-81ED-4DB2-BD59-A6C34878D82A}">
-                    <a16:rowId xmlns:a16="http://schemas.microsoft.com/office/drawing/2014/main" xmlns="" val="10000"/>
+                    <a16:rowId xmlns="" xmlns:a16="http://schemas.microsoft.com/office/drawing/2014/main" val="10000"/>
                   </a:ext>
                 </a:extLst>
               </a:tr>
@@ -11527,7 +11528,7 @@
                 </a:tc>
                 <a:extLst>
                   <a:ext uri="{0D108BD9-81ED-4DB2-BD59-A6C34878D82A}">
-                    <a16:rowId xmlns:a16="http://schemas.microsoft.com/office/drawing/2014/main" xmlns="" val="10001"/>
+                    <a16:rowId xmlns="" xmlns:a16="http://schemas.microsoft.com/office/drawing/2014/main" val="10001"/>
                   </a:ext>
                 </a:extLst>
               </a:tr>
@@ -11579,7 +11580,7 @@
                 </a:tc>
                 <a:extLst>
                   <a:ext uri="{0D108BD9-81ED-4DB2-BD59-A6C34878D82A}">
-                    <a16:rowId xmlns:a16="http://schemas.microsoft.com/office/drawing/2014/main" xmlns="" val="10002"/>
+                    <a16:rowId xmlns="" xmlns:a16="http://schemas.microsoft.com/office/drawing/2014/main" val="10002"/>
                   </a:ext>
                 </a:extLst>
               </a:tr>
@@ -11631,7 +11632,7 @@
                 </a:tc>
                 <a:extLst>
                   <a:ext uri="{0D108BD9-81ED-4DB2-BD59-A6C34878D82A}">
-                    <a16:rowId xmlns:a16="http://schemas.microsoft.com/office/drawing/2014/main" xmlns="" val="10003"/>
+                    <a16:rowId xmlns="" xmlns:a16="http://schemas.microsoft.com/office/drawing/2014/main" val="10003"/>
                   </a:ext>
                 </a:extLst>
               </a:tr>
@@ -11720,7 +11721,7 @@
           <p:nvPr>
             <p:extLst>
               <p:ext uri="{D42A27DB-BD31-4B8C-83A1-F6EECF244321}">
-                <p14:modId xmlns:p14="http://schemas.microsoft.com/office/powerpoint/2010/main" xmlns="" val="365258077"/>
+                <p14:modId xmlns="" xmlns:p14="http://schemas.microsoft.com/office/powerpoint/2010/main" val="365258077"/>
               </p:ext>
             </p:extLst>
           </p:nvPr>
@@ -11740,28 +11741,28 @@
                 <a:gridCol w="925253">
                   <a:extLst>
                     <a:ext uri="{9D8B030D-6E8A-4147-A177-3AD203B41FA5}">
-                      <a16:colId xmlns:a16="http://schemas.microsoft.com/office/drawing/2014/main" xmlns="" val="20000"/>
+                      <a16:colId xmlns="" xmlns:a16="http://schemas.microsoft.com/office/drawing/2014/main" val="20000"/>
                     </a:ext>
                   </a:extLst>
                 </a:gridCol>
                 <a:gridCol w="1255701">
                   <a:extLst>
                     <a:ext uri="{9D8B030D-6E8A-4147-A177-3AD203B41FA5}">
-                      <a16:colId xmlns:a16="http://schemas.microsoft.com/office/drawing/2014/main" xmlns="" val="20001"/>
+                      <a16:colId xmlns="" xmlns:a16="http://schemas.microsoft.com/office/drawing/2014/main" val="20001"/>
                     </a:ext>
                   </a:extLst>
                 </a:gridCol>
                 <a:gridCol w="1387880">
                   <a:extLst>
                     <a:ext uri="{9D8B030D-6E8A-4147-A177-3AD203B41FA5}">
-                      <a16:colId xmlns:a16="http://schemas.microsoft.com/office/drawing/2014/main" xmlns="" val="20002"/>
+                      <a16:colId xmlns="" xmlns:a16="http://schemas.microsoft.com/office/drawing/2014/main" val="20002"/>
                     </a:ext>
                   </a:extLst>
                 </a:gridCol>
                 <a:gridCol w="1255701">
                   <a:extLst>
                     <a:ext uri="{9D8B030D-6E8A-4147-A177-3AD203B41FA5}">
-                      <a16:colId xmlns:a16="http://schemas.microsoft.com/office/drawing/2014/main" xmlns="" val="20003"/>
+                      <a16:colId xmlns="" xmlns:a16="http://schemas.microsoft.com/office/drawing/2014/main" val="20003"/>
                     </a:ext>
                   </a:extLst>
                 </a:gridCol>
@@ -11831,7 +11832,7 @@
                 </a:tc>
                 <a:extLst>
                   <a:ext uri="{0D108BD9-81ED-4DB2-BD59-A6C34878D82A}">
-                    <a16:rowId xmlns:a16="http://schemas.microsoft.com/office/drawing/2014/main" xmlns="" val="10000"/>
+                    <a16:rowId xmlns="" xmlns:a16="http://schemas.microsoft.com/office/drawing/2014/main" val="10000"/>
                   </a:ext>
                 </a:extLst>
               </a:tr>
@@ -11896,7 +11897,7 @@
                 </a:tc>
                 <a:extLst>
                   <a:ext uri="{0D108BD9-81ED-4DB2-BD59-A6C34878D82A}">
-                    <a16:rowId xmlns:a16="http://schemas.microsoft.com/office/drawing/2014/main" xmlns="" val="10001"/>
+                    <a16:rowId xmlns="" xmlns:a16="http://schemas.microsoft.com/office/drawing/2014/main" val="10001"/>
                   </a:ext>
                 </a:extLst>
               </a:tr>
@@ -11948,7 +11949,7 @@
                 </a:tc>
                 <a:extLst>
                   <a:ext uri="{0D108BD9-81ED-4DB2-BD59-A6C34878D82A}">
-                    <a16:rowId xmlns:a16="http://schemas.microsoft.com/office/drawing/2014/main" xmlns="" val="10002"/>
+                    <a16:rowId xmlns="" xmlns:a16="http://schemas.microsoft.com/office/drawing/2014/main" val="10002"/>
                   </a:ext>
                 </a:extLst>
               </a:tr>
@@ -12000,7 +12001,7 @@
                 </a:tc>
                 <a:extLst>
                   <a:ext uri="{0D108BD9-81ED-4DB2-BD59-A6C34878D82A}">
-                    <a16:rowId xmlns:a16="http://schemas.microsoft.com/office/drawing/2014/main" xmlns="" val="10003"/>
+                    <a16:rowId xmlns="" xmlns:a16="http://schemas.microsoft.com/office/drawing/2014/main" val="10003"/>
                   </a:ext>
                 </a:extLst>
               </a:tr>
@@ -12013,7 +12014,7 @@
           <p:cNvPr id="10" name="Bilde 9" descr="F14 silhouette.png">
             <a:extLst>
               <a:ext uri="{FF2B5EF4-FFF2-40B4-BE49-F238E27FC236}">
-                <a16:creationId xmlns:a16="http://schemas.microsoft.com/office/drawing/2014/main" xmlns="" id="{28A7CB58-CDE9-46CF-8C53-6BC0BF8D5442}"/>
+                <a16:creationId xmlns="" xmlns:a16="http://schemas.microsoft.com/office/drawing/2014/main" id="{28A7CB58-CDE9-46CF-8C53-6BC0BF8D5442}"/>
               </a:ext>
             </a:extLst>
           </p:cNvPr>
@@ -12043,7 +12044,7 @@
           <p:cNvPr id="11" name="Bilde 10" descr="F14 silhouette.png">
             <a:extLst>
               <a:ext uri="{FF2B5EF4-FFF2-40B4-BE49-F238E27FC236}">
-                <a16:creationId xmlns:a16="http://schemas.microsoft.com/office/drawing/2014/main" xmlns="" id="{05B6EEA2-F977-4F2C-9C3D-BB2E0224F0B6}"/>
+                <a16:creationId xmlns="" xmlns:a16="http://schemas.microsoft.com/office/drawing/2014/main" id="{05B6EEA2-F977-4F2C-9C3D-BB2E0224F0B6}"/>
               </a:ext>
             </a:extLst>
           </p:cNvPr>
@@ -12073,7 +12074,7 @@
           <p:cNvPr id="12" name="Bilde 11" descr="F14 silhouette.png">
             <a:extLst>
               <a:ext uri="{FF2B5EF4-FFF2-40B4-BE49-F238E27FC236}">
-                <a16:creationId xmlns:a16="http://schemas.microsoft.com/office/drawing/2014/main" xmlns="" id="{D386152B-3573-4F44-A247-036ACE58169E}"/>
+                <a16:creationId xmlns="" xmlns:a16="http://schemas.microsoft.com/office/drawing/2014/main" id="{D386152B-3573-4F44-A247-036ACE58169E}"/>
               </a:ext>
             </a:extLst>
           </p:cNvPr>
@@ -20164,7 +20165,7 @@
           <p:cNvPr id="41" name="Bilde 40" descr="F16 above.png">
             <a:extLst>
               <a:ext uri="{FF2B5EF4-FFF2-40B4-BE49-F238E27FC236}">
-                <a16:creationId xmlns:a16="http://schemas.microsoft.com/office/drawing/2014/main" xmlns="" id="{41365F98-DE81-4BBC-892C-0007C16D8226}"/>
+                <a16:creationId xmlns="" xmlns:a16="http://schemas.microsoft.com/office/drawing/2014/main" id="{41365F98-DE81-4BBC-892C-0007C16D8226}"/>
               </a:ext>
             </a:extLst>
           </p:cNvPr>
@@ -20194,7 +20195,7 @@
           <p:cNvPr id="43" name="Bilde 42" descr="F16 above.png">
             <a:extLst>
               <a:ext uri="{FF2B5EF4-FFF2-40B4-BE49-F238E27FC236}">
-                <a16:creationId xmlns:a16="http://schemas.microsoft.com/office/drawing/2014/main" xmlns="" id="{2F56A164-1BBD-4DD2-8A7D-4BA76E2C4C24}"/>
+                <a16:creationId xmlns="" xmlns:a16="http://schemas.microsoft.com/office/drawing/2014/main" id="{2F56A164-1BBD-4DD2-8A7D-4BA76E2C4C24}"/>
               </a:ext>
             </a:extLst>
           </p:cNvPr>
@@ -23615,7 +23616,7 @@
           <p:cNvPr id="41" name="Bilde 40" descr="F16 above.png">
             <a:extLst>
               <a:ext uri="{FF2B5EF4-FFF2-40B4-BE49-F238E27FC236}">
-                <a16:creationId xmlns:a16="http://schemas.microsoft.com/office/drawing/2014/main" xmlns="" id="{41365F98-DE81-4BBC-892C-0007C16D8226}"/>
+                <a16:creationId xmlns="" xmlns:a16="http://schemas.microsoft.com/office/drawing/2014/main" id="{41365F98-DE81-4BBC-892C-0007C16D8226}"/>
               </a:ext>
             </a:extLst>
           </p:cNvPr>
@@ -23645,7 +23646,7 @@
           <p:cNvPr id="43" name="Bilde 42" descr="F16 above.png">
             <a:extLst>
               <a:ext uri="{FF2B5EF4-FFF2-40B4-BE49-F238E27FC236}">
-                <a16:creationId xmlns:a16="http://schemas.microsoft.com/office/drawing/2014/main" xmlns="" id="{2F56A164-1BBD-4DD2-8A7D-4BA76E2C4C24}"/>
+                <a16:creationId xmlns="" xmlns:a16="http://schemas.microsoft.com/office/drawing/2014/main" id="{2F56A164-1BBD-4DD2-8A7D-4BA76E2C4C24}"/>
               </a:ext>
             </a:extLst>
           </p:cNvPr>
@@ -30564,7 +30565,7 @@
           <p:cNvPr id="41" name="Bilde 40" descr="F16 above.png">
             <a:extLst>
               <a:ext uri="{FF2B5EF4-FFF2-40B4-BE49-F238E27FC236}">
-                <a16:creationId xmlns:a16="http://schemas.microsoft.com/office/drawing/2014/main" xmlns="" id="{41365F98-DE81-4BBC-892C-0007C16D8226}"/>
+                <a16:creationId xmlns="" xmlns:a16="http://schemas.microsoft.com/office/drawing/2014/main" id="{41365F98-DE81-4BBC-892C-0007C16D8226}"/>
               </a:ext>
             </a:extLst>
           </p:cNvPr>
@@ -30594,7 +30595,7 @@
           <p:cNvPr id="43" name="Bilde 42" descr="F16 above.png">
             <a:extLst>
               <a:ext uri="{FF2B5EF4-FFF2-40B4-BE49-F238E27FC236}">
-                <a16:creationId xmlns:a16="http://schemas.microsoft.com/office/drawing/2014/main" xmlns="" id="{2F56A164-1BBD-4DD2-8A7D-4BA76E2C4C24}"/>
+                <a16:creationId xmlns="" xmlns:a16="http://schemas.microsoft.com/office/drawing/2014/main" id="{2F56A164-1BBD-4DD2-8A7D-4BA76E2C4C24}"/>
               </a:ext>
             </a:extLst>
           </p:cNvPr>
@@ -31869,7 +31870,7 @@
           <p:cNvPr id="32" name="Bilde 31" descr="F14 above.png">
             <a:extLst>
               <a:ext uri="{FF2B5EF4-FFF2-40B4-BE49-F238E27FC236}">
-                <a16:creationId xmlns:a16="http://schemas.microsoft.com/office/drawing/2014/main" xmlns="" id="{B491E58F-5739-4A9E-97A8-515250424D5E}"/>
+                <a16:creationId xmlns="" xmlns:a16="http://schemas.microsoft.com/office/drawing/2014/main" id="{B491E58F-5739-4A9E-97A8-515250424D5E}"/>
               </a:ext>
             </a:extLst>
           </p:cNvPr>
@@ -31899,7 +31900,7 @@
           <p:cNvPr id="38" name="Bilde 37" descr="F14 above.png">
             <a:extLst>
               <a:ext uri="{FF2B5EF4-FFF2-40B4-BE49-F238E27FC236}">
-                <a16:creationId xmlns:a16="http://schemas.microsoft.com/office/drawing/2014/main" xmlns="" id="{DCCC45F0-C406-47F3-9D6F-BEB2B90D0002}"/>
+                <a16:creationId xmlns="" xmlns:a16="http://schemas.microsoft.com/office/drawing/2014/main" id="{DCCC45F0-C406-47F3-9D6F-BEB2B90D0002}"/>
               </a:ext>
             </a:extLst>
           </p:cNvPr>
@@ -44060,7 +44061,7 @@
     </p:spTree>
     <p:extLst>
       <p:ext uri="{BB962C8B-B14F-4D97-AF65-F5344CB8AC3E}">
-        <p14:creationId xmlns:p14="http://schemas.microsoft.com/office/powerpoint/2010/main" xmlns="" val="3611620817"/>
+        <p14:creationId xmlns="" xmlns:p14="http://schemas.microsoft.com/office/powerpoint/2010/main" val="3611620817"/>
       </p:ext>
     </p:extLst>
   </p:cSld>
@@ -44092,7 +44093,7 @@
           <p:cNvPr id="3" name="Likebent trekant 2">
             <a:extLst>
               <a:ext uri="{FF2B5EF4-FFF2-40B4-BE49-F238E27FC236}">
-                <a16:creationId xmlns:a16="http://schemas.microsoft.com/office/drawing/2014/main" xmlns="" id="{B04ECB0A-D434-4B60-A0C5-F29B3AE16A86}"/>
+                <a16:creationId xmlns="" xmlns:a16="http://schemas.microsoft.com/office/drawing/2014/main" id="{B04ECB0A-D434-4B60-A0C5-F29B3AE16A86}"/>
               </a:ext>
             </a:extLst>
           </p:cNvPr>
@@ -44146,7 +44147,7 @@
           <p:cNvPr id="5" name="Rett pil 94">
             <a:extLst>
               <a:ext uri="{FF2B5EF4-FFF2-40B4-BE49-F238E27FC236}">
-                <a16:creationId xmlns:a16="http://schemas.microsoft.com/office/drawing/2014/main" xmlns="" id="{289F5DF3-FB20-4055-91CB-FEA0637743FF}"/>
+                <a16:creationId xmlns="" xmlns:a16="http://schemas.microsoft.com/office/drawing/2014/main" id="{289F5DF3-FB20-4055-91CB-FEA0637743FF}"/>
               </a:ext>
             </a:extLst>
           </p:cNvPr>
@@ -44190,7 +44191,7 @@
           <p:cNvPr id="6" name="Bue 5">
             <a:extLst>
               <a:ext uri="{FF2B5EF4-FFF2-40B4-BE49-F238E27FC236}">
-                <a16:creationId xmlns:a16="http://schemas.microsoft.com/office/drawing/2014/main" xmlns="" id="{29295DA4-D53A-4F93-B4A8-32E111244AF8}"/>
+                <a16:creationId xmlns="" xmlns:a16="http://schemas.microsoft.com/office/drawing/2014/main" id="{29295DA4-D53A-4F93-B4A8-32E111244AF8}"/>
               </a:ext>
             </a:extLst>
           </p:cNvPr>
@@ -44244,7 +44245,7 @@
           <p:cNvPr id="7" name="TekstSylinder 6">
             <a:extLst>
               <a:ext uri="{FF2B5EF4-FFF2-40B4-BE49-F238E27FC236}">
-                <a16:creationId xmlns:a16="http://schemas.microsoft.com/office/drawing/2014/main" xmlns="" id="{544B1DEC-E3B6-4359-B75E-F30B592ECD5C}"/>
+                <a16:creationId xmlns="" xmlns:a16="http://schemas.microsoft.com/office/drawing/2014/main" id="{544B1DEC-E3B6-4359-B75E-F30B592ECD5C}"/>
               </a:ext>
             </a:extLst>
           </p:cNvPr>
@@ -44284,7 +44285,7 @@
           <p:cNvPr id="8" name="TekstSylinder 7">
             <a:extLst>
               <a:ext uri="{FF2B5EF4-FFF2-40B4-BE49-F238E27FC236}">
-                <a16:creationId xmlns:a16="http://schemas.microsoft.com/office/drawing/2014/main" xmlns="" id="{A38A7398-7E31-4E10-B5EC-848175384361}"/>
+                <a16:creationId xmlns="" xmlns:a16="http://schemas.microsoft.com/office/drawing/2014/main" id="{A38A7398-7E31-4E10-B5EC-848175384361}"/>
               </a:ext>
             </a:extLst>
           </p:cNvPr>
@@ -44324,7 +44325,7 @@
           <p:cNvPr id="10" name="Rett linje 9">
             <a:extLst>
               <a:ext uri="{FF2B5EF4-FFF2-40B4-BE49-F238E27FC236}">
-                <a16:creationId xmlns:a16="http://schemas.microsoft.com/office/drawing/2014/main" xmlns="" id="{3691A1F4-68D6-4AE1-B695-538DD4142DF9}"/>
+                <a16:creationId xmlns="" xmlns:a16="http://schemas.microsoft.com/office/drawing/2014/main" id="{3691A1F4-68D6-4AE1-B695-538DD4142DF9}"/>
               </a:ext>
             </a:extLst>
           </p:cNvPr>
@@ -44367,7 +44368,7 @@
           <p:cNvPr id="12" name="Rett linje 11">
             <a:extLst>
               <a:ext uri="{FF2B5EF4-FFF2-40B4-BE49-F238E27FC236}">
-                <a16:creationId xmlns:a16="http://schemas.microsoft.com/office/drawing/2014/main" xmlns="" id="{57928C5C-D0E9-41DA-8B2B-4D4805A4B7B0}"/>
+                <a16:creationId xmlns="" xmlns:a16="http://schemas.microsoft.com/office/drawing/2014/main" id="{57928C5C-D0E9-41DA-8B2B-4D4805A4B7B0}"/>
               </a:ext>
             </a:extLst>
           </p:cNvPr>
@@ -44410,7 +44411,7 @@
           <p:cNvPr id="14" name="TekstSylinder 13">
             <a:extLst>
               <a:ext uri="{FF2B5EF4-FFF2-40B4-BE49-F238E27FC236}">
-                <a16:creationId xmlns:a16="http://schemas.microsoft.com/office/drawing/2014/main" xmlns="" id="{501358CA-BBBF-46AE-BFD7-C02117A442C6}"/>
+                <a16:creationId xmlns="" xmlns:a16="http://schemas.microsoft.com/office/drawing/2014/main" id="{501358CA-BBBF-46AE-BFD7-C02117A442C6}"/>
               </a:ext>
             </a:extLst>
           </p:cNvPr>
@@ -44450,7 +44451,7 @@
           <p:cNvPr id="2" name="Bilde 1" descr="F16 above.png">
             <a:extLst>
               <a:ext uri="{FF2B5EF4-FFF2-40B4-BE49-F238E27FC236}">
-                <a16:creationId xmlns:a16="http://schemas.microsoft.com/office/drawing/2014/main" xmlns="" id="{DA82CFCE-48FA-4C97-A1C3-FD8FD93D75AF}"/>
+                <a16:creationId xmlns="" xmlns:a16="http://schemas.microsoft.com/office/drawing/2014/main" id="{DA82CFCE-48FA-4C97-A1C3-FD8FD93D75AF}"/>
               </a:ext>
             </a:extLst>
           </p:cNvPr>
@@ -44480,7 +44481,7 @@
           <p:cNvPr id="16" name="Rett linje 15">
             <a:extLst>
               <a:ext uri="{FF2B5EF4-FFF2-40B4-BE49-F238E27FC236}">
-                <a16:creationId xmlns:a16="http://schemas.microsoft.com/office/drawing/2014/main" xmlns="" id="{16D17831-68E5-4CE1-9E02-7EBE8CE2579A}"/>
+                <a16:creationId xmlns="" xmlns:a16="http://schemas.microsoft.com/office/drawing/2014/main" id="{16D17831-68E5-4CE1-9E02-7EBE8CE2579A}"/>
               </a:ext>
             </a:extLst>
           </p:cNvPr>
@@ -44526,7 +44527,7 @@
           <p:cNvPr id="18" name="Likebent trekant 17">
             <a:extLst>
               <a:ext uri="{FF2B5EF4-FFF2-40B4-BE49-F238E27FC236}">
-                <a16:creationId xmlns:a16="http://schemas.microsoft.com/office/drawing/2014/main" xmlns="" id="{A6F3DCD0-15EC-42DE-AA4A-4B363CBF00B1}"/>
+                <a16:creationId xmlns="" xmlns:a16="http://schemas.microsoft.com/office/drawing/2014/main" id="{A6F3DCD0-15EC-42DE-AA4A-4B363CBF00B1}"/>
               </a:ext>
             </a:extLst>
           </p:cNvPr>
@@ -44580,7 +44581,7 @@
           <p:cNvPr id="19" name="Rett linje 18">
             <a:extLst>
               <a:ext uri="{FF2B5EF4-FFF2-40B4-BE49-F238E27FC236}">
-                <a16:creationId xmlns:a16="http://schemas.microsoft.com/office/drawing/2014/main" xmlns="" id="{A9871B2D-383B-4D60-BE9B-CF673FD4779E}"/>
+                <a16:creationId xmlns="" xmlns:a16="http://schemas.microsoft.com/office/drawing/2014/main" id="{A9871B2D-383B-4D60-BE9B-CF673FD4779E}"/>
               </a:ext>
             </a:extLst>
           </p:cNvPr>
@@ -44626,7 +44627,7 @@
           <p:cNvPr id="22" name="TekstSylinder 21">
             <a:extLst>
               <a:ext uri="{FF2B5EF4-FFF2-40B4-BE49-F238E27FC236}">
-                <a16:creationId xmlns:a16="http://schemas.microsoft.com/office/drawing/2014/main" xmlns="" id="{CC170198-41D4-4F28-975D-CBB54D360743}"/>
+                <a16:creationId xmlns="" xmlns:a16="http://schemas.microsoft.com/office/drawing/2014/main" id="{CC170198-41D4-4F28-975D-CBB54D360743}"/>
               </a:ext>
             </a:extLst>
           </p:cNvPr>
@@ -45107,7 +45108,7 @@
           <p:cNvPr id="23" name="Bue 22">
             <a:extLst>
               <a:ext uri="{FF2B5EF4-FFF2-40B4-BE49-F238E27FC236}">
-                <a16:creationId xmlns:a16="http://schemas.microsoft.com/office/drawing/2014/main" xmlns="" id="{CE732115-08E9-4DFF-B418-7CAB3908DC00}"/>
+                <a16:creationId xmlns="" xmlns:a16="http://schemas.microsoft.com/office/drawing/2014/main" id="{CE732115-08E9-4DFF-B418-7CAB3908DC00}"/>
               </a:ext>
             </a:extLst>
           </p:cNvPr>
@@ -45156,7 +45157,7 @@
           <p:cNvPr id="24" name="TekstSylinder 23">
             <a:extLst>
               <a:ext uri="{FF2B5EF4-FFF2-40B4-BE49-F238E27FC236}">
-                <a16:creationId xmlns:a16="http://schemas.microsoft.com/office/drawing/2014/main" xmlns="" id="{AC298FBD-136B-45C6-8789-EBEFB2631590}"/>
+                <a16:creationId xmlns="" xmlns:a16="http://schemas.microsoft.com/office/drawing/2014/main" id="{AC298FBD-136B-45C6-8789-EBEFB2631590}"/>
               </a:ext>
             </a:extLst>
           </p:cNvPr>
@@ -45191,7 +45192,7 @@
           <p:cNvPr id="25" name="TekstSylinder 24">
             <a:extLst>
               <a:ext uri="{FF2B5EF4-FFF2-40B4-BE49-F238E27FC236}">
-                <a16:creationId xmlns:a16="http://schemas.microsoft.com/office/drawing/2014/main" xmlns="" id="{253F5391-89A7-440B-B548-3BCFFCC3B225}"/>
+                <a16:creationId xmlns="" xmlns:a16="http://schemas.microsoft.com/office/drawing/2014/main" id="{253F5391-89A7-440B-B548-3BCFFCC3B225}"/>
               </a:ext>
             </a:extLst>
           </p:cNvPr>
@@ -45230,7 +45231,7 @@
           <p:cNvPr id="26" name="TekstSylinder 25">
             <a:extLst>
               <a:ext uri="{FF2B5EF4-FFF2-40B4-BE49-F238E27FC236}">
-                <a16:creationId xmlns:a16="http://schemas.microsoft.com/office/drawing/2014/main" xmlns="" id="{58712FC6-7D95-4B4F-86BD-26C8D046C3D5}"/>
+                <a16:creationId xmlns="" xmlns:a16="http://schemas.microsoft.com/office/drawing/2014/main" id="{58712FC6-7D95-4B4F-86BD-26C8D046C3D5}"/>
               </a:ext>
             </a:extLst>
           </p:cNvPr>
@@ -45293,9 +45294,67 @@
     </p:spTree>
     <p:extLst>
       <p:ext uri="{BB962C8B-B14F-4D97-AF65-F5344CB8AC3E}">
-        <p14:creationId xmlns:p14="http://schemas.microsoft.com/office/powerpoint/2010/main" xmlns="" val="3467176037"/>
+        <p14:creationId xmlns="" xmlns:p14="http://schemas.microsoft.com/office/powerpoint/2010/main" val="3467176037"/>
       </p:ext>
     </p:extLst>
+  </p:cSld>
+  <p:clrMapOvr>
+    <a:masterClrMapping/>
+  </p:clrMapOvr>
+</p:sld>
+</file>
+
+<file path=ppt/slides/slide37.xml><?xml version="1.0" encoding="utf-8"?>
+<p:sld xmlns:a="http://schemas.openxmlformats.org/drawingml/2006/main" xmlns:r="http://schemas.openxmlformats.org/officeDocument/2006/relationships" xmlns:p="http://schemas.openxmlformats.org/presentationml/2006/main">
+  <p:cSld>
+    <p:spTree>
+      <p:nvGrpSpPr>
+        <p:cNvPr id="1" name=""/>
+        <p:cNvGrpSpPr/>
+        <p:nvPr/>
+      </p:nvGrpSpPr>
+      <p:grpSpPr>
+        <a:xfrm>
+          <a:off x="0" y="0"/>
+          <a:ext cx="0" cy="0"/>
+          <a:chOff x="0" y="0"/>
+          <a:chExt cx="0" cy="0"/>
+        </a:xfrm>
+      </p:grpSpPr>
+      <p:pic>
+        <p:nvPicPr>
+          <p:cNvPr id="1026" name="Picture 2"/>
+          <p:cNvPicPr>
+            <a:picLocks noChangeAspect="1" noChangeArrowheads="1"/>
+          </p:cNvPicPr>
+          <p:nvPr/>
+        </p:nvPicPr>
+        <p:blipFill>
+          <a:blip r:embed="rId2"/>
+          <a:srcRect/>
+          <a:stretch>
+            <a:fillRect/>
+          </a:stretch>
+        </p:blipFill>
+        <p:spPr bwMode="auto">
+          <a:xfrm>
+            <a:off x="1000125" y="647700"/>
+            <a:ext cx="7143750" cy="5562600"/>
+          </a:xfrm>
+          <a:prstGeom prst="rect">
+            <a:avLst/>
+          </a:prstGeom>
+          <a:noFill/>
+          <a:ln w="9525">
+            <a:noFill/>
+            <a:miter lim="800000"/>
+            <a:headEnd/>
+            <a:tailEnd/>
+          </a:ln>
+          <a:effectLst/>
+        </p:spPr>
+      </p:pic>
+    </p:spTree>
   </p:cSld>
   <p:clrMapOvr>
     <a:masterClrMapping/>
@@ -47198,7 +47257,7 @@
           <p:cNvPr id="20" name="Bilde 19" descr="F14 above.png">
             <a:extLst>
               <a:ext uri="{FF2B5EF4-FFF2-40B4-BE49-F238E27FC236}">
-                <a16:creationId xmlns:a16="http://schemas.microsoft.com/office/drawing/2014/main" xmlns="" id="{994D61FE-539D-402D-82B9-BD3CE4BCFDE1}"/>
+                <a16:creationId xmlns="" xmlns:a16="http://schemas.microsoft.com/office/drawing/2014/main" id="{994D61FE-539D-402D-82B9-BD3CE4BCFDE1}"/>
               </a:ext>
             </a:extLst>
           </p:cNvPr>
@@ -47932,7 +47991,7 @@
           <p:cNvPr id="8" name="Bilde 7" descr="F16 above.png">
             <a:extLst>
               <a:ext uri="{FF2B5EF4-FFF2-40B4-BE49-F238E27FC236}">
-                <a16:creationId xmlns:a16="http://schemas.microsoft.com/office/drawing/2014/main" xmlns="" id="{54E69CFD-7983-4EE5-B3AC-A26405B44FC0}"/>
+                <a16:creationId xmlns="" xmlns:a16="http://schemas.microsoft.com/office/drawing/2014/main" id="{54E69CFD-7983-4EE5-B3AC-A26405B44FC0}"/>
               </a:ext>
             </a:extLst>
           </p:cNvPr>

</xml_diff>